<commit_message>
fixed smth and added task
</commit_message>
<xml_diff>
--- a/module_02/pres.pptx
+++ b/module_02/pres.pptx
@@ -5,7 +5,7 @@
     <p:sldMasterId id="2147483648" r:id="rId1"/>
   </p:sldMasterIdLst>
   <p:notesMasterIdLst>
-    <p:notesMasterId r:id="rId16"/>
+    <p:notesMasterId r:id="rId17"/>
   </p:notesMasterIdLst>
   <p:sldIdLst>
     <p:sldId id="256" r:id="rId2"/>
@@ -21,7 +21,8 @@
     <p:sldId id="272" r:id="rId12"/>
     <p:sldId id="274" r:id="rId13"/>
     <p:sldId id="269" r:id="rId14"/>
-    <p:sldId id="266" r:id="rId15"/>
+    <p:sldId id="276" r:id="rId15"/>
+    <p:sldId id="266" r:id="rId16"/>
   </p:sldIdLst>
   <p:sldSz cx="12192000" cy="6858000"/>
   <p:notesSz cx="6858000" cy="9144000"/>
@@ -131,796 +132,6 @@
 <file path=ppt/changesInfos/changesInfo1.xml><?xml version="1.0" encoding="utf-8"?>
 <pc:chgInfo xmlns:a="http://schemas.openxmlformats.org/drawingml/2006/main" xmlns:r="http://schemas.openxmlformats.org/officeDocument/2006/relationships" xmlns:ac="http://schemas.microsoft.com/office/drawing/2013/main/command" xmlns:pc="http://schemas.microsoft.com/office/powerpoint/2013/main/command">
   <pc:docChgLst>
-    <pc:chgData name="Мария Савинова" userId="e24eaf7e9b1ed84c" providerId="LiveId" clId="{FBA2780E-5BE6-4AEE-8C8C-EA7D3EE18985}"/>
-    <pc:docChg chg="undo redo custSel addSld delSld modSld sldOrd">
-      <pc:chgData name="Мария Савинова" userId="e24eaf7e9b1ed84c" providerId="LiveId" clId="{FBA2780E-5BE6-4AEE-8C8C-EA7D3EE18985}" dt="2024-09-23T14:03:41.281" v="2951"/>
-      <pc:docMkLst>
-        <pc:docMk/>
-      </pc:docMkLst>
-      <pc:sldChg chg="modSp mod">
-        <pc:chgData name="Мария Савинова" userId="e24eaf7e9b1ed84c" providerId="LiveId" clId="{FBA2780E-5BE6-4AEE-8C8C-EA7D3EE18985}" dt="2024-09-20T22:04:41.987" v="2" actId="2711"/>
-        <pc:sldMkLst>
-          <pc:docMk/>
-          <pc:sldMk cId="967994007" sldId="256"/>
-        </pc:sldMkLst>
-        <pc:spChg chg="mod">
-          <ac:chgData name="Мария Савинова" userId="e24eaf7e9b1ed84c" providerId="LiveId" clId="{FBA2780E-5BE6-4AEE-8C8C-EA7D3EE18985}" dt="2024-09-20T22:04:41.987" v="2" actId="2711"/>
-          <ac:spMkLst>
-            <pc:docMk/>
-            <pc:sldMk cId="967994007" sldId="256"/>
-            <ac:spMk id="2" creationId="{00000000-0000-0000-0000-000000000000}"/>
-          </ac:spMkLst>
-        </pc:spChg>
-      </pc:sldChg>
-      <pc:sldChg chg="modSp mod">
-        <pc:chgData name="Мария Савинова" userId="e24eaf7e9b1ed84c" providerId="LiveId" clId="{FBA2780E-5BE6-4AEE-8C8C-EA7D3EE18985}" dt="2024-09-20T22:30:23.716" v="765" actId="2710"/>
-        <pc:sldMkLst>
-          <pc:docMk/>
-          <pc:sldMk cId="4014811966" sldId="257"/>
-        </pc:sldMkLst>
-        <pc:spChg chg="mod">
-          <ac:chgData name="Мария Савинова" userId="e24eaf7e9b1ed84c" providerId="LiveId" clId="{FBA2780E-5BE6-4AEE-8C8C-EA7D3EE18985}" dt="2024-09-20T22:30:23.716" v="765" actId="2710"/>
-          <ac:spMkLst>
-            <pc:docMk/>
-            <pc:sldMk cId="4014811966" sldId="257"/>
-            <ac:spMk id="3" creationId="{00000000-0000-0000-0000-000000000000}"/>
-          </ac:spMkLst>
-        </pc:spChg>
-      </pc:sldChg>
-      <pc:sldChg chg="addSp delSp modSp mod">
-        <pc:chgData name="Мария Савинова" userId="e24eaf7e9b1ed84c" providerId="LiveId" clId="{FBA2780E-5BE6-4AEE-8C8C-EA7D3EE18985}" dt="2024-09-23T14:01:58.412" v="2927" actId="20577"/>
-        <pc:sldMkLst>
-          <pc:docMk/>
-          <pc:sldMk cId="742912908" sldId="258"/>
-        </pc:sldMkLst>
-        <pc:spChg chg="mod">
-          <ac:chgData name="Мария Савинова" userId="e24eaf7e9b1ed84c" providerId="LiveId" clId="{FBA2780E-5BE6-4AEE-8C8C-EA7D3EE18985}" dt="2024-09-20T22:06:31.655" v="25" actId="113"/>
-          <ac:spMkLst>
-            <pc:docMk/>
-            <pc:sldMk cId="742912908" sldId="258"/>
-            <ac:spMk id="2" creationId="{00000000-0000-0000-0000-000000000000}"/>
-          </ac:spMkLst>
-        </pc:spChg>
-        <pc:spChg chg="mod">
-          <ac:chgData name="Мария Савинова" userId="e24eaf7e9b1ed84c" providerId="LiveId" clId="{FBA2780E-5BE6-4AEE-8C8C-EA7D3EE18985}" dt="2024-09-23T14:01:58.412" v="2927" actId="20577"/>
-          <ac:spMkLst>
-            <pc:docMk/>
-            <pc:sldMk cId="742912908" sldId="258"/>
-            <ac:spMk id="3" creationId="{00000000-0000-0000-0000-000000000000}"/>
-          </ac:spMkLst>
-        </pc:spChg>
-        <pc:spChg chg="add del mod">
-          <ac:chgData name="Мария Савинова" userId="e24eaf7e9b1ed84c" providerId="LiveId" clId="{FBA2780E-5BE6-4AEE-8C8C-EA7D3EE18985}" dt="2024-09-20T22:21:55.870" v="468" actId="1036"/>
-          <ac:spMkLst>
-            <pc:docMk/>
-            <pc:sldMk cId="742912908" sldId="258"/>
-            <ac:spMk id="8" creationId="{143DF86B-0F1D-4327-BA47-4BA88D0280EF}"/>
-          </ac:spMkLst>
-        </pc:spChg>
-        <pc:spChg chg="add del mod">
-          <ac:chgData name="Мария Савинова" userId="e24eaf7e9b1ed84c" providerId="LiveId" clId="{FBA2780E-5BE6-4AEE-8C8C-EA7D3EE18985}" dt="2024-09-20T22:44:32.202" v="1121"/>
-          <ac:spMkLst>
-            <pc:docMk/>
-            <pc:sldMk cId="742912908" sldId="258"/>
-            <ac:spMk id="9" creationId="{8FAC235C-B49B-40FD-A71D-CEF085AC2F61}"/>
-          </ac:spMkLst>
-        </pc:spChg>
-        <pc:spChg chg="add del mod">
-          <ac:chgData name="Мария Савинова" userId="e24eaf7e9b1ed84c" providerId="LiveId" clId="{FBA2780E-5BE6-4AEE-8C8C-EA7D3EE18985}" dt="2024-09-20T22:18:36.721" v="359" actId="478"/>
-          <ac:spMkLst>
-            <pc:docMk/>
-            <pc:sldMk cId="742912908" sldId="258"/>
-            <ac:spMk id="10" creationId="{159B5573-2CA5-4320-AFF0-1FFBB07A7CA5}"/>
-          </ac:spMkLst>
-        </pc:spChg>
-      </pc:sldChg>
-      <pc:sldChg chg="modSp add mod">
-        <pc:chgData name="Мария Савинова" userId="e24eaf7e9b1ed84c" providerId="LiveId" clId="{FBA2780E-5BE6-4AEE-8C8C-EA7D3EE18985}" dt="2024-09-23T14:02:05.745" v="2928" actId="20577"/>
-        <pc:sldMkLst>
-          <pc:docMk/>
-          <pc:sldMk cId="2839600060" sldId="259"/>
-        </pc:sldMkLst>
-        <pc:spChg chg="mod">
-          <ac:chgData name="Мария Савинова" userId="e24eaf7e9b1ed84c" providerId="LiveId" clId="{FBA2780E-5BE6-4AEE-8C8C-EA7D3EE18985}" dt="2024-09-20T22:06:43.243" v="38" actId="20577"/>
-          <ac:spMkLst>
-            <pc:docMk/>
-            <pc:sldMk cId="2839600060" sldId="259"/>
-            <ac:spMk id="2" creationId="{00000000-0000-0000-0000-000000000000}"/>
-          </ac:spMkLst>
-        </pc:spChg>
-        <pc:spChg chg="mod">
-          <ac:chgData name="Мария Савинова" userId="e24eaf7e9b1ed84c" providerId="LiveId" clId="{FBA2780E-5BE6-4AEE-8C8C-EA7D3EE18985}" dt="2024-09-23T14:02:05.745" v="2928" actId="20577"/>
-          <ac:spMkLst>
-            <pc:docMk/>
-            <pc:sldMk cId="2839600060" sldId="259"/>
-            <ac:spMk id="3" creationId="{00000000-0000-0000-0000-000000000000}"/>
-          </ac:spMkLst>
-        </pc:spChg>
-      </pc:sldChg>
-      <pc:sldChg chg="addSp delSp modSp add mod">
-        <pc:chgData name="Мария Савинова" userId="e24eaf7e9b1ed84c" providerId="LiveId" clId="{FBA2780E-5BE6-4AEE-8C8C-EA7D3EE18985}" dt="2024-09-23T14:02:16.177" v="2932" actId="20577"/>
-        <pc:sldMkLst>
-          <pc:docMk/>
-          <pc:sldMk cId="1758739892" sldId="260"/>
-        </pc:sldMkLst>
-        <pc:spChg chg="mod">
-          <ac:chgData name="Мария Савинова" userId="e24eaf7e9b1ed84c" providerId="LiveId" clId="{FBA2780E-5BE6-4AEE-8C8C-EA7D3EE18985}" dt="2024-09-20T22:25:43.261" v="678" actId="20577"/>
-          <ac:spMkLst>
-            <pc:docMk/>
-            <pc:sldMk cId="1758739892" sldId="260"/>
-            <ac:spMk id="2" creationId="{00000000-0000-0000-0000-000000000000}"/>
-          </ac:spMkLst>
-        </pc:spChg>
-        <pc:spChg chg="mod">
-          <ac:chgData name="Мария Савинова" userId="e24eaf7e9b1ed84c" providerId="LiveId" clId="{FBA2780E-5BE6-4AEE-8C8C-EA7D3EE18985}" dt="2024-09-23T14:02:16.177" v="2932" actId="20577"/>
-          <ac:spMkLst>
-            <pc:docMk/>
-            <pc:sldMk cId="1758739892" sldId="260"/>
-            <ac:spMk id="3" creationId="{00000000-0000-0000-0000-000000000000}"/>
-          </ac:spMkLst>
-        </pc:spChg>
-        <pc:spChg chg="mod">
-          <ac:chgData name="Мария Савинова" userId="e24eaf7e9b1ed84c" providerId="LiveId" clId="{FBA2780E-5BE6-4AEE-8C8C-EA7D3EE18985}" dt="2024-09-23T08:20:51.586" v="1942" actId="2711"/>
-          <ac:spMkLst>
-            <pc:docMk/>
-            <pc:sldMk cId="1758739892" sldId="260"/>
-            <ac:spMk id="4" creationId="{00000000-0000-0000-0000-000000000000}"/>
-          </ac:spMkLst>
-        </pc:spChg>
-        <pc:spChg chg="add del mod">
-          <ac:chgData name="Мария Савинова" userId="e24eaf7e9b1ed84c" providerId="LiveId" clId="{FBA2780E-5BE6-4AEE-8C8C-EA7D3EE18985}" dt="2024-09-20T22:25:01.200" v="596"/>
-          <ac:spMkLst>
-            <pc:docMk/>
-            <pc:sldMk cId="1758739892" sldId="260"/>
-            <ac:spMk id="8" creationId="{E5EF931D-D382-4C75-99AA-41E8EC200C70}"/>
-          </ac:spMkLst>
-        </pc:spChg>
-        <pc:spChg chg="add del mod">
-          <ac:chgData name="Мария Савинова" userId="e24eaf7e9b1ed84c" providerId="LiveId" clId="{FBA2780E-5BE6-4AEE-8C8C-EA7D3EE18985}" dt="2024-09-20T22:25:01.200" v="596"/>
-          <ac:spMkLst>
-            <pc:docMk/>
-            <pc:sldMk cId="1758739892" sldId="260"/>
-            <ac:spMk id="9" creationId="{D9F10936-68B0-447C-B532-CEBDE6B1B911}"/>
-          </ac:spMkLst>
-        </pc:spChg>
-        <pc:spChg chg="add del mod">
-          <ac:chgData name="Мария Савинова" userId="e24eaf7e9b1ed84c" providerId="LiveId" clId="{FBA2780E-5BE6-4AEE-8C8C-EA7D3EE18985}" dt="2024-09-20T22:26:00.207" v="697" actId="478"/>
-          <ac:spMkLst>
-            <pc:docMk/>
-            <pc:sldMk cId="1758739892" sldId="260"/>
-            <ac:spMk id="10" creationId="{F77BE8FF-22FF-43AE-A5D6-3DDD19AEF4C3}"/>
-          </ac:spMkLst>
-        </pc:spChg>
-        <pc:spChg chg="add del mod">
-          <ac:chgData name="Мария Савинова" userId="e24eaf7e9b1ed84c" providerId="LiveId" clId="{FBA2780E-5BE6-4AEE-8C8C-EA7D3EE18985}" dt="2024-09-20T22:26:00.207" v="697" actId="478"/>
-          <ac:spMkLst>
-            <pc:docMk/>
-            <pc:sldMk cId="1758739892" sldId="260"/>
-            <ac:spMk id="11" creationId="{A4E96537-5032-42E5-853F-EF68D0D0E2F9}"/>
-          </ac:spMkLst>
-        </pc:spChg>
-      </pc:sldChg>
-      <pc:sldChg chg="addSp delSp modSp add mod">
-        <pc:chgData name="Мария Савинова" userId="e24eaf7e9b1ed84c" providerId="LiveId" clId="{FBA2780E-5BE6-4AEE-8C8C-EA7D3EE18985}" dt="2024-09-23T08:21:07.949" v="1944" actId="2711"/>
-        <pc:sldMkLst>
-          <pc:docMk/>
-          <pc:sldMk cId="600860783" sldId="261"/>
-        </pc:sldMkLst>
-        <pc:spChg chg="mod">
-          <ac:chgData name="Мария Савинова" userId="e24eaf7e9b1ed84c" providerId="LiveId" clId="{FBA2780E-5BE6-4AEE-8C8C-EA7D3EE18985}" dt="2024-09-20T22:45:27.292" v="1153" actId="20577"/>
-          <ac:spMkLst>
-            <pc:docMk/>
-            <pc:sldMk cId="600860783" sldId="261"/>
-            <ac:spMk id="2" creationId="{00000000-0000-0000-0000-000000000000}"/>
-          </ac:spMkLst>
-        </pc:spChg>
-        <pc:spChg chg="add del mod">
-          <ac:chgData name="Мария Савинова" userId="e24eaf7e9b1ed84c" providerId="LiveId" clId="{FBA2780E-5BE6-4AEE-8C8C-EA7D3EE18985}" dt="2024-09-20T23:04:42.008" v="1579" actId="207"/>
-          <ac:spMkLst>
-            <pc:docMk/>
-            <pc:sldMk cId="600860783" sldId="261"/>
-            <ac:spMk id="3" creationId="{00000000-0000-0000-0000-000000000000}"/>
-          </ac:spMkLst>
-        </pc:spChg>
-        <pc:spChg chg="mod">
-          <ac:chgData name="Мария Савинова" userId="e24eaf7e9b1ed84c" providerId="LiveId" clId="{FBA2780E-5BE6-4AEE-8C8C-EA7D3EE18985}" dt="2024-09-23T08:21:07.949" v="1944" actId="2711"/>
-          <ac:spMkLst>
-            <pc:docMk/>
-            <pc:sldMk cId="600860783" sldId="261"/>
-            <ac:spMk id="4" creationId="{00000000-0000-0000-0000-000000000000}"/>
-          </ac:spMkLst>
-        </pc:spChg>
-        <pc:spChg chg="add del mod">
-          <ac:chgData name="Мария Савинова" userId="e24eaf7e9b1ed84c" providerId="LiveId" clId="{FBA2780E-5BE6-4AEE-8C8C-EA7D3EE18985}" dt="2024-09-20T22:43:15.747" v="1100" actId="22"/>
-          <ac:spMkLst>
-            <pc:docMk/>
-            <pc:sldMk cId="600860783" sldId="261"/>
-            <ac:spMk id="14" creationId="{03A4D306-268D-421A-9429-E8A6D3A0783E}"/>
-          </ac:spMkLst>
-        </pc:spChg>
-        <pc:spChg chg="add del mod">
-          <ac:chgData name="Мария Савинова" userId="e24eaf7e9b1ed84c" providerId="LiveId" clId="{FBA2780E-5BE6-4AEE-8C8C-EA7D3EE18985}" dt="2024-09-20T22:43:13.526" v="1095"/>
-          <ac:spMkLst>
-            <pc:docMk/>
-            <pc:sldMk cId="600860783" sldId="261"/>
-            <ac:spMk id="15" creationId="{DB7FD0E9-6E8E-4AD9-9700-12C9E66382F4}"/>
-          </ac:spMkLst>
-        </pc:spChg>
-        <pc:spChg chg="add del mod">
-          <ac:chgData name="Мария Савинова" userId="e24eaf7e9b1ed84c" providerId="LiveId" clId="{FBA2780E-5BE6-4AEE-8C8C-EA7D3EE18985}" dt="2024-09-20T22:49:11.893" v="1215" actId="478"/>
-          <ac:spMkLst>
-            <pc:docMk/>
-            <pc:sldMk cId="600860783" sldId="261"/>
-            <ac:spMk id="17" creationId="{DBBE5F54-A7B2-4FFC-9E6D-ADEAC307AF61}"/>
-          </ac:spMkLst>
-        </pc:spChg>
-        <pc:spChg chg="add del mod">
-          <ac:chgData name="Мария Савинова" userId="e24eaf7e9b1ed84c" providerId="LiveId" clId="{FBA2780E-5BE6-4AEE-8C8C-EA7D3EE18985}" dt="2024-09-20T22:49:11.893" v="1215" actId="478"/>
-          <ac:spMkLst>
-            <pc:docMk/>
-            <pc:sldMk cId="600860783" sldId="261"/>
-            <ac:spMk id="18" creationId="{FE6A15AD-9C16-4693-B2BE-234F6D9BDF29}"/>
-          </ac:spMkLst>
-        </pc:spChg>
-        <pc:picChg chg="add del mod ord">
-          <ac:chgData name="Мария Савинова" userId="e24eaf7e9b1ed84c" providerId="LiveId" clId="{FBA2780E-5BE6-4AEE-8C8C-EA7D3EE18985}" dt="2024-09-20T22:39:02.526" v="1026" actId="22"/>
-          <ac:picMkLst>
-            <pc:docMk/>
-            <pc:sldMk cId="600860783" sldId="261"/>
-            <ac:picMk id="8" creationId="{EDED9590-9BC3-44DD-8E6F-35CDD821EC56}"/>
-          </ac:picMkLst>
-        </pc:picChg>
-        <pc:picChg chg="add del mod modCrop">
-          <ac:chgData name="Мария Савинова" userId="e24eaf7e9b1ed84c" providerId="LiveId" clId="{FBA2780E-5BE6-4AEE-8C8C-EA7D3EE18985}" dt="2024-09-20T22:39:57.028" v="1037" actId="478"/>
-          <ac:picMkLst>
-            <pc:docMk/>
-            <pc:sldMk cId="600860783" sldId="261"/>
-            <ac:picMk id="10" creationId="{E6ECBEEB-DB74-4815-83F6-DA099BFF09E4}"/>
-          </ac:picMkLst>
-        </pc:picChg>
-        <pc:picChg chg="add mod">
-          <ac:chgData name="Мария Савинова" userId="e24eaf7e9b1ed84c" providerId="LiveId" clId="{FBA2780E-5BE6-4AEE-8C8C-EA7D3EE18985}" dt="2024-09-20T23:04:36.707" v="1578" actId="1076"/>
-          <ac:picMkLst>
-            <pc:docMk/>
-            <pc:sldMk cId="600860783" sldId="261"/>
-            <ac:picMk id="12" creationId="{3C7851B5-3554-480E-BE26-3BB8F8EB47A8}"/>
-          </ac:picMkLst>
-        </pc:picChg>
-      </pc:sldChg>
-      <pc:sldChg chg="addSp delSp modSp add mod">
-        <pc:chgData name="Мария Савинова" userId="e24eaf7e9b1ed84c" providerId="LiveId" clId="{FBA2780E-5BE6-4AEE-8C8C-EA7D3EE18985}" dt="2024-09-23T14:03:06.125" v="2948" actId="20577"/>
-        <pc:sldMkLst>
-          <pc:docMk/>
-          <pc:sldMk cId="2293707358" sldId="262"/>
-        </pc:sldMkLst>
-        <pc:spChg chg="mod">
-          <ac:chgData name="Мария Савинова" userId="e24eaf7e9b1ed84c" providerId="LiveId" clId="{FBA2780E-5BE6-4AEE-8C8C-EA7D3EE18985}" dt="2024-09-20T22:49:34.578" v="1229" actId="255"/>
-          <ac:spMkLst>
-            <pc:docMk/>
-            <pc:sldMk cId="2293707358" sldId="262"/>
-            <ac:spMk id="2" creationId="{00000000-0000-0000-0000-000000000000}"/>
-          </ac:spMkLst>
-        </pc:spChg>
-        <pc:spChg chg="mod">
-          <ac:chgData name="Мария Савинова" userId="e24eaf7e9b1ed84c" providerId="LiveId" clId="{FBA2780E-5BE6-4AEE-8C8C-EA7D3EE18985}" dt="2024-09-23T14:03:06.125" v="2948" actId="20577"/>
-          <ac:spMkLst>
-            <pc:docMk/>
-            <pc:sldMk cId="2293707358" sldId="262"/>
-            <ac:spMk id="3" creationId="{00000000-0000-0000-0000-000000000000}"/>
-          </ac:spMkLst>
-        </pc:spChg>
-        <pc:spChg chg="add del mod">
-          <ac:chgData name="Мария Савинова" userId="e24eaf7e9b1ed84c" providerId="LiveId" clId="{FBA2780E-5BE6-4AEE-8C8C-EA7D3EE18985}" dt="2024-09-23T08:39:08.653" v="2004" actId="478"/>
-          <ac:spMkLst>
-            <pc:docMk/>
-            <pc:sldMk cId="2293707358" sldId="262"/>
-            <ac:spMk id="8" creationId="{D4C95291-2C23-4352-BCC0-5C4F93100524}"/>
-          </ac:spMkLst>
-        </pc:spChg>
-        <pc:spChg chg="add del mod">
-          <ac:chgData name="Мария Савинова" userId="e24eaf7e9b1ed84c" providerId="LiveId" clId="{FBA2780E-5BE6-4AEE-8C8C-EA7D3EE18985}" dt="2024-09-23T08:39:10.841" v="2005" actId="478"/>
-          <ac:spMkLst>
-            <pc:docMk/>
-            <pc:sldMk cId="2293707358" sldId="262"/>
-            <ac:spMk id="9" creationId="{B11FA133-F035-4245-8E62-A414ADF52242}"/>
-          </ac:spMkLst>
-        </pc:spChg>
-        <pc:spChg chg="add del mod">
-          <ac:chgData name="Мария Савинова" userId="e24eaf7e9b1ed84c" providerId="LiveId" clId="{FBA2780E-5BE6-4AEE-8C8C-EA7D3EE18985}" dt="2024-09-20T22:52:37.463" v="1304" actId="478"/>
-          <ac:spMkLst>
-            <pc:docMk/>
-            <pc:sldMk cId="2293707358" sldId="262"/>
-            <ac:spMk id="10" creationId="{C6319FCC-5266-4C84-9F8A-38F424A8EDAA}"/>
-          </ac:spMkLst>
-        </pc:spChg>
-      </pc:sldChg>
-      <pc:sldChg chg="addSp modSp add mod">
-        <pc:chgData name="Мария Савинова" userId="e24eaf7e9b1ed84c" providerId="LiveId" clId="{FBA2780E-5BE6-4AEE-8C8C-EA7D3EE18985}" dt="2024-09-23T14:03:19.646" v="2949"/>
-        <pc:sldMkLst>
-          <pc:docMk/>
-          <pc:sldMk cId="3632604304" sldId="263"/>
-        </pc:sldMkLst>
-        <pc:spChg chg="mod">
-          <ac:chgData name="Мария Савинова" userId="e24eaf7e9b1ed84c" providerId="LiveId" clId="{FBA2780E-5BE6-4AEE-8C8C-EA7D3EE18985}" dt="2024-09-20T22:53:24.063" v="1323" actId="255"/>
-          <ac:spMkLst>
-            <pc:docMk/>
-            <pc:sldMk cId="3632604304" sldId="263"/>
-            <ac:spMk id="2" creationId="{00000000-0000-0000-0000-000000000000}"/>
-          </ac:spMkLst>
-        </pc:spChg>
-        <pc:spChg chg="mod">
-          <ac:chgData name="Мария Савинова" userId="e24eaf7e9b1ed84c" providerId="LiveId" clId="{FBA2780E-5BE6-4AEE-8C8C-EA7D3EE18985}" dt="2024-09-23T13:49:24.098" v="2726" actId="20577"/>
-          <ac:spMkLst>
-            <pc:docMk/>
-            <pc:sldMk cId="3632604304" sldId="263"/>
-            <ac:spMk id="3" creationId="{00000000-0000-0000-0000-000000000000}"/>
-          </ac:spMkLst>
-        </pc:spChg>
-        <pc:spChg chg="mod">
-          <ac:chgData name="Мария Савинова" userId="e24eaf7e9b1ed84c" providerId="LiveId" clId="{FBA2780E-5BE6-4AEE-8C8C-EA7D3EE18985}" dt="2024-09-23T08:20:45.596" v="1941" actId="2711"/>
-          <ac:spMkLst>
-            <pc:docMk/>
-            <pc:sldMk cId="3632604304" sldId="263"/>
-            <ac:spMk id="4" creationId="{00000000-0000-0000-0000-000000000000}"/>
-          </ac:spMkLst>
-        </pc:spChg>
-        <pc:spChg chg="add mod">
-          <ac:chgData name="Мария Савинова" userId="e24eaf7e9b1ed84c" providerId="LiveId" clId="{FBA2780E-5BE6-4AEE-8C8C-EA7D3EE18985}" dt="2024-09-23T14:03:19.646" v="2949"/>
-          <ac:spMkLst>
-            <pc:docMk/>
-            <pc:sldMk cId="3632604304" sldId="263"/>
-            <ac:spMk id="10" creationId="{06F7FA00-9462-463A-82F0-CF3D67B70160}"/>
-          </ac:spMkLst>
-        </pc:spChg>
-        <pc:spChg chg="add mod">
-          <ac:chgData name="Мария Савинова" userId="e24eaf7e9b1ed84c" providerId="LiveId" clId="{FBA2780E-5BE6-4AEE-8C8C-EA7D3EE18985}" dt="2024-09-23T13:39:01.682" v="2402" actId="207"/>
-          <ac:spMkLst>
-            <pc:docMk/>
-            <pc:sldMk cId="3632604304" sldId="263"/>
-            <ac:spMk id="11" creationId="{0E686081-C68F-4292-B742-E5FC2F20847F}"/>
-          </ac:spMkLst>
-        </pc:spChg>
-        <pc:picChg chg="add mod">
-          <ac:chgData name="Мария Савинова" userId="e24eaf7e9b1ed84c" providerId="LiveId" clId="{FBA2780E-5BE6-4AEE-8C8C-EA7D3EE18985}" dt="2024-09-23T08:42:35.716" v="2134" actId="1076"/>
-          <ac:picMkLst>
-            <pc:docMk/>
-            <pc:sldMk cId="3632604304" sldId="263"/>
-            <ac:picMk id="8" creationId="{A51CFDCE-016F-46DE-A41A-3E752F019132}"/>
-          </ac:picMkLst>
-        </pc:picChg>
-      </pc:sldChg>
-      <pc:sldChg chg="modSp add mod">
-        <pc:chgData name="Мария Савинова" userId="e24eaf7e9b1ed84c" providerId="LiveId" clId="{FBA2780E-5BE6-4AEE-8C8C-EA7D3EE18985}" dt="2024-09-23T14:03:27.960" v="2950"/>
-        <pc:sldMkLst>
-          <pc:docMk/>
-          <pc:sldMk cId="36148254" sldId="264"/>
-        </pc:sldMkLst>
-        <pc:spChg chg="mod">
-          <ac:chgData name="Мария Савинова" userId="e24eaf7e9b1ed84c" providerId="LiveId" clId="{FBA2780E-5BE6-4AEE-8C8C-EA7D3EE18985}" dt="2024-09-23T13:38:38.254" v="2400" actId="20577"/>
-          <ac:spMkLst>
-            <pc:docMk/>
-            <pc:sldMk cId="36148254" sldId="264"/>
-            <ac:spMk id="2" creationId="{00000000-0000-0000-0000-000000000000}"/>
-          </ac:spMkLst>
-        </pc:spChg>
-        <pc:spChg chg="mod">
-          <ac:chgData name="Мария Савинова" userId="e24eaf7e9b1ed84c" providerId="LiveId" clId="{FBA2780E-5BE6-4AEE-8C8C-EA7D3EE18985}" dt="2024-09-23T14:03:27.960" v="2950"/>
-          <ac:spMkLst>
-            <pc:docMk/>
-            <pc:sldMk cId="36148254" sldId="264"/>
-            <ac:spMk id="3" creationId="{00000000-0000-0000-0000-000000000000}"/>
-          </ac:spMkLst>
-        </pc:spChg>
-      </pc:sldChg>
-      <pc:sldChg chg="addSp delSp modSp add mod">
-        <pc:chgData name="Мария Савинова" userId="e24eaf7e9b1ed84c" providerId="LiveId" clId="{FBA2780E-5BE6-4AEE-8C8C-EA7D3EE18985}" dt="2024-09-23T14:03:41.281" v="2951"/>
-        <pc:sldMkLst>
-          <pc:docMk/>
-          <pc:sldMk cId="2299204813" sldId="265"/>
-        </pc:sldMkLst>
-        <pc:spChg chg="mod">
-          <ac:chgData name="Мария Савинова" userId="e24eaf7e9b1ed84c" providerId="LiveId" clId="{FBA2780E-5BE6-4AEE-8C8C-EA7D3EE18985}" dt="2024-09-20T23:02:01.286" v="1535" actId="20577"/>
-          <ac:spMkLst>
-            <pc:docMk/>
-            <pc:sldMk cId="2299204813" sldId="265"/>
-            <ac:spMk id="2" creationId="{00000000-0000-0000-0000-000000000000}"/>
-          </ac:spMkLst>
-        </pc:spChg>
-        <pc:spChg chg="mod">
-          <ac:chgData name="Мария Савинова" userId="e24eaf7e9b1ed84c" providerId="LiveId" clId="{FBA2780E-5BE6-4AEE-8C8C-EA7D3EE18985}" dt="2024-09-23T14:03:41.281" v="2951"/>
-          <ac:spMkLst>
-            <pc:docMk/>
-            <pc:sldMk cId="2299204813" sldId="265"/>
-            <ac:spMk id="3" creationId="{00000000-0000-0000-0000-000000000000}"/>
-          </ac:spMkLst>
-        </pc:spChg>
-        <pc:spChg chg="add del mod">
-          <ac:chgData name="Мария Савинова" userId="e24eaf7e9b1ed84c" providerId="LiveId" clId="{FBA2780E-5BE6-4AEE-8C8C-EA7D3EE18985}" dt="2024-09-23T13:46:24.868" v="2585"/>
-          <ac:spMkLst>
-            <pc:docMk/>
-            <pc:sldMk cId="2299204813" sldId="265"/>
-            <ac:spMk id="6" creationId="{DFD64BB7-3ADF-4F6F-B34B-E853B4C08AB8}"/>
-          </ac:spMkLst>
-        </pc:spChg>
-        <pc:spChg chg="add del mod">
-          <ac:chgData name="Мария Савинова" userId="e24eaf7e9b1ed84c" providerId="LiveId" clId="{FBA2780E-5BE6-4AEE-8C8C-EA7D3EE18985}" dt="2024-09-23T13:45:59.652" v="2579" actId="478"/>
-          <ac:spMkLst>
-            <pc:docMk/>
-            <pc:sldMk cId="2299204813" sldId="265"/>
-            <ac:spMk id="8" creationId="{957AA84F-8897-4933-85BC-FB0080066665}"/>
-          </ac:spMkLst>
-        </pc:spChg>
-        <pc:spChg chg="add del mod">
-          <ac:chgData name="Мария Савинова" userId="e24eaf7e9b1ed84c" providerId="LiveId" clId="{FBA2780E-5BE6-4AEE-8C8C-EA7D3EE18985}" dt="2024-09-23T13:46:01.733" v="2580" actId="478"/>
-          <ac:spMkLst>
-            <pc:docMk/>
-            <pc:sldMk cId="2299204813" sldId="265"/>
-            <ac:spMk id="9" creationId="{791872D6-869B-4CA8-8997-4959251037CA}"/>
-          </ac:spMkLst>
-        </pc:spChg>
-        <pc:spChg chg="add del mod">
-          <ac:chgData name="Мария Савинова" userId="e24eaf7e9b1ed84c" providerId="LiveId" clId="{FBA2780E-5BE6-4AEE-8C8C-EA7D3EE18985}" dt="2024-09-23T13:46:24.868" v="2585"/>
-          <ac:spMkLst>
-            <pc:docMk/>
-            <pc:sldMk cId="2299204813" sldId="265"/>
-            <ac:spMk id="10" creationId="{5C0C52F8-DAF1-4428-9A84-853511E00A4B}"/>
-          </ac:spMkLst>
-        </pc:spChg>
-      </pc:sldChg>
-      <pc:sldChg chg="delSp modSp add mod">
-        <pc:chgData name="Мария Савинова" userId="e24eaf7e9b1ed84c" providerId="LiveId" clId="{FBA2780E-5BE6-4AEE-8C8C-EA7D3EE18985}" dt="2024-09-20T23:09:44.555" v="1702" actId="1076"/>
-        <pc:sldMkLst>
-          <pc:docMk/>
-          <pc:sldMk cId="3474348753" sldId="266"/>
-        </pc:sldMkLst>
-        <pc:spChg chg="del mod">
-          <ac:chgData name="Мария Савинова" userId="e24eaf7e9b1ed84c" providerId="LiveId" clId="{FBA2780E-5BE6-4AEE-8C8C-EA7D3EE18985}" dt="2024-09-20T22:12:05.625" v="116" actId="478"/>
-          <ac:spMkLst>
-            <pc:docMk/>
-            <pc:sldMk cId="3474348753" sldId="266"/>
-            <ac:spMk id="2" creationId="{00000000-0000-0000-0000-000000000000}"/>
-          </ac:spMkLst>
-        </pc:spChg>
-        <pc:spChg chg="mod">
-          <ac:chgData name="Мария Савинова" userId="e24eaf7e9b1ed84c" providerId="LiveId" clId="{FBA2780E-5BE6-4AEE-8C8C-EA7D3EE18985}" dt="2024-09-20T23:09:44.555" v="1702" actId="1076"/>
-          <ac:spMkLst>
-            <pc:docMk/>
-            <pc:sldMk cId="3474348753" sldId="266"/>
-            <ac:spMk id="3" creationId="{00000000-0000-0000-0000-000000000000}"/>
-          </ac:spMkLst>
-        </pc:spChg>
-      </pc:sldChg>
-      <pc:sldChg chg="add del">
-        <pc:chgData name="Мария Савинова" userId="e24eaf7e9b1ed84c" providerId="LiveId" clId="{FBA2780E-5BE6-4AEE-8C8C-EA7D3EE18985}" dt="2024-09-20T22:44:24.906" v="1119" actId="47"/>
-        <pc:sldMkLst>
-          <pc:docMk/>
-          <pc:sldMk cId="1581301969" sldId="267"/>
-        </pc:sldMkLst>
-      </pc:sldChg>
-      <pc:sldChg chg="addSp modSp add del mod">
-        <pc:chgData name="Мария Савинова" userId="e24eaf7e9b1ed84c" providerId="LiveId" clId="{FBA2780E-5BE6-4AEE-8C8C-EA7D3EE18985}" dt="2024-09-20T22:38:48.706" v="1024" actId="47"/>
-        <pc:sldMkLst>
-          <pc:docMk/>
-          <pc:sldMk cId="3762584318" sldId="267"/>
-        </pc:sldMkLst>
-        <pc:spChg chg="mod">
-          <ac:chgData name="Мария Савинова" userId="e24eaf7e9b1ed84c" providerId="LiveId" clId="{FBA2780E-5BE6-4AEE-8C8C-EA7D3EE18985}" dt="2024-09-20T22:38:27.029" v="1023" actId="20577"/>
-          <ac:spMkLst>
-            <pc:docMk/>
-            <pc:sldMk cId="3762584318" sldId="267"/>
-            <ac:spMk id="3" creationId="{00000000-0000-0000-0000-000000000000}"/>
-          </ac:spMkLst>
-        </pc:spChg>
-        <pc:picChg chg="add mod modCrop">
-          <ac:chgData name="Мария Савинова" userId="e24eaf7e9b1ed84c" providerId="LiveId" clId="{FBA2780E-5BE6-4AEE-8C8C-EA7D3EE18985}" dt="2024-09-20T22:38:08.304" v="1019" actId="14100"/>
-          <ac:picMkLst>
-            <pc:docMk/>
-            <pc:sldMk cId="3762584318" sldId="267"/>
-            <ac:picMk id="8" creationId="{4445FA39-BB8E-41B6-B13A-2DF3C2EC95AE}"/>
-          </ac:picMkLst>
-        </pc:picChg>
-      </pc:sldChg>
-      <pc:sldChg chg="addSp delSp modSp add mod ord">
-        <pc:chgData name="Мария Савинова" userId="e24eaf7e9b1ed84c" providerId="LiveId" clId="{FBA2780E-5BE6-4AEE-8C8C-EA7D3EE18985}" dt="2024-09-23T14:02:32.432" v="2935" actId="14100"/>
-        <pc:sldMkLst>
-          <pc:docMk/>
-          <pc:sldMk cId="3551373186" sldId="268"/>
-        </pc:sldMkLst>
-        <pc:spChg chg="mod">
-          <ac:chgData name="Мария Савинова" userId="e24eaf7e9b1ed84c" providerId="LiveId" clId="{FBA2780E-5BE6-4AEE-8C8C-EA7D3EE18985}" dt="2024-09-20T22:44:11.789" v="1118"/>
-          <ac:spMkLst>
-            <pc:docMk/>
-            <pc:sldMk cId="3551373186" sldId="268"/>
-            <ac:spMk id="2" creationId="{00000000-0000-0000-0000-000000000000}"/>
-          </ac:spMkLst>
-        </pc:spChg>
-        <pc:spChg chg="mod">
-          <ac:chgData name="Мария Савинова" userId="e24eaf7e9b1ed84c" providerId="LiveId" clId="{FBA2780E-5BE6-4AEE-8C8C-EA7D3EE18985}" dt="2024-09-23T14:02:24.134" v="2933" actId="20577"/>
-          <ac:spMkLst>
-            <pc:docMk/>
-            <pc:sldMk cId="3551373186" sldId="268"/>
-            <ac:spMk id="3" creationId="{00000000-0000-0000-0000-000000000000}"/>
-          </ac:spMkLst>
-        </pc:spChg>
-        <pc:spChg chg="mod">
-          <ac:chgData name="Мария Савинова" userId="e24eaf7e9b1ed84c" providerId="LiveId" clId="{FBA2780E-5BE6-4AEE-8C8C-EA7D3EE18985}" dt="2024-09-23T08:21:02.966" v="1943" actId="2711"/>
-          <ac:spMkLst>
-            <pc:docMk/>
-            <pc:sldMk cId="3551373186" sldId="268"/>
-            <ac:spMk id="4" creationId="{00000000-0000-0000-0000-000000000000}"/>
-          </ac:spMkLst>
-        </pc:spChg>
-        <pc:spChg chg="add del mod">
-          <ac:chgData name="Мария Савинова" userId="e24eaf7e9b1ed84c" providerId="LiveId" clId="{FBA2780E-5BE6-4AEE-8C8C-EA7D3EE18985}" dt="2024-09-20T22:47:30.081" v="1195" actId="22"/>
-          <ac:spMkLst>
-            <pc:docMk/>
-            <pc:sldMk cId="3551373186" sldId="268"/>
-            <ac:spMk id="11" creationId="{EC1EB092-D82C-4A8B-B0AD-9AE1ECC5B533}"/>
-          </ac:spMkLst>
-        </pc:spChg>
-        <pc:picChg chg="add mod modCrop">
-          <ac:chgData name="Мария Савинова" userId="e24eaf7e9b1ed84c" providerId="LiveId" clId="{FBA2780E-5BE6-4AEE-8C8C-EA7D3EE18985}" dt="2024-09-23T14:02:32.432" v="2935" actId="14100"/>
-          <ac:picMkLst>
-            <pc:docMk/>
-            <pc:sldMk cId="3551373186" sldId="268"/>
-            <ac:picMk id="8" creationId="{D8BA093B-DDAC-4953-BA84-FAB983FB2288}"/>
-          </ac:picMkLst>
-        </pc:picChg>
-        <pc:picChg chg="del">
-          <ac:chgData name="Мария Савинова" userId="e24eaf7e9b1ed84c" providerId="LiveId" clId="{FBA2780E-5BE6-4AEE-8C8C-EA7D3EE18985}" dt="2024-09-20T22:45:42.148" v="1154" actId="478"/>
-          <ac:picMkLst>
-            <pc:docMk/>
-            <pc:sldMk cId="3551373186" sldId="268"/>
-            <ac:picMk id="12" creationId="{3C7851B5-3554-480E-BE26-3BB8F8EB47A8}"/>
-          </ac:picMkLst>
-        </pc:picChg>
-      </pc:sldChg>
-      <pc:sldChg chg="modSp add mod">
-        <pc:chgData name="Мария Савинова" userId="e24eaf7e9b1ed84c" providerId="LiveId" clId="{FBA2780E-5BE6-4AEE-8C8C-EA7D3EE18985}" dt="2024-09-23T14:01:22.979" v="2926" actId="207"/>
-        <pc:sldMkLst>
-          <pc:docMk/>
-          <pc:sldMk cId="2023720995" sldId="269"/>
-        </pc:sldMkLst>
-        <pc:spChg chg="mod">
-          <ac:chgData name="Мария Савинова" userId="e24eaf7e9b1ed84c" providerId="LiveId" clId="{FBA2780E-5BE6-4AEE-8C8C-EA7D3EE18985}" dt="2024-09-23T14:01:22.979" v="2926" actId="207"/>
-          <ac:spMkLst>
-            <pc:docMk/>
-            <pc:sldMk cId="2023720995" sldId="269"/>
-            <ac:spMk id="3" creationId="{00000000-0000-0000-0000-000000000000}"/>
-          </ac:spMkLst>
-        </pc:spChg>
-      </pc:sldChg>
-      <pc:sldChg chg="addSp delSp modSp add mod">
-        <pc:chgData name="Мария Савинова" userId="e24eaf7e9b1ed84c" providerId="LiveId" clId="{FBA2780E-5BE6-4AEE-8C8C-EA7D3EE18985}" dt="2024-09-23T13:49:37.211" v="2731" actId="20577"/>
-        <pc:sldMkLst>
-          <pc:docMk/>
-          <pc:sldMk cId="1268225968" sldId="270"/>
-        </pc:sldMkLst>
-        <pc:spChg chg="add del mod">
-          <ac:chgData name="Мария Савинова" userId="e24eaf7e9b1ed84c" providerId="LiveId" clId="{FBA2780E-5BE6-4AEE-8C8C-EA7D3EE18985}" dt="2024-09-23T13:49:37.211" v="2731" actId="20577"/>
-          <ac:spMkLst>
-            <pc:docMk/>
-            <pc:sldMk cId="1268225968" sldId="270"/>
-            <ac:spMk id="3" creationId="{00000000-0000-0000-0000-000000000000}"/>
-          </ac:spMkLst>
-        </pc:spChg>
-        <pc:spChg chg="del">
-          <ac:chgData name="Мария Савинова" userId="e24eaf7e9b1ed84c" providerId="LiveId" clId="{FBA2780E-5BE6-4AEE-8C8C-EA7D3EE18985}" dt="2024-09-23T08:03:13.967" v="1729" actId="478"/>
-          <ac:spMkLst>
-            <pc:docMk/>
-            <pc:sldMk cId="1268225968" sldId="270"/>
-            <ac:spMk id="8" creationId="{D4C95291-2C23-4352-BCC0-5C4F93100524}"/>
-          </ac:spMkLst>
-        </pc:spChg>
-        <pc:spChg chg="del">
-          <ac:chgData name="Мария Савинова" userId="e24eaf7e9b1ed84c" providerId="LiveId" clId="{FBA2780E-5BE6-4AEE-8C8C-EA7D3EE18985}" dt="2024-09-23T08:03:12.557" v="1728" actId="478"/>
-          <ac:spMkLst>
-            <pc:docMk/>
-            <pc:sldMk cId="1268225968" sldId="270"/>
-            <ac:spMk id="9" creationId="{B11FA133-F035-4245-8E62-A414ADF52242}"/>
-          </ac:spMkLst>
-        </pc:spChg>
-        <pc:spChg chg="add del">
-          <ac:chgData name="Мария Савинова" userId="e24eaf7e9b1ed84c" providerId="LiveId" clId="{FBA2780E-5BE6-4AEE-8C8C-EA7D3EE18985}" dt="2024-09-23T08:04:07.918" v="1739" actId="22"/>
-          <ac:spMkLst>
-            <pc:docMk/>
-            <pc:sldMk cId="1268225968" sldId="270"/>
-            <ac:spMk id="14" creationId="{8455FD95-B63D-47A2-A031-D16D531B9D63}"/>
-          </ac:spMkLst>
-        </pc:spChg>
-        <pc:picChg chg="add del mod">
-          <ac:chgData name="Мария Савинова" userId="e24eaf7e9b1ed84c" providerId="LiveId" clId="{FBA2780E-5BE6-4AEE-8C8C-EA7D3EE18985}" dt="2024-09-23T08:03:29.403" v="1733"/>
-          <ac:picMkLst>
-            <pc:docMk/>
-            <pc:sldMk cId="1268225968" sldId="270"/>
-            <ac:picMk id="10" creationId="{C00D257A-41E4-46A0-ACE2-A71D549CBFE7}"/>
-          </ac:picMkLst>
-        </pc:picChg>
-        <pc:picChg chg="add mod">
-          <ac:chgData name="Мария Савинова" userId="e24eaf7e9b1ed84c" providerId="LiveId" clId="{FBA2780E-5BE6-4AEE-8C8C-EA7D3EE18985}" dt="2024-09-23T08:40:10.157" v="2021" actId="1076"/>
-          <ac:picMkLst>
-            <pc:docMk/>
-            <pc:sldMk cId="1268225968" sldId="270"/>
-            <ac:picMk id="12" creationId="{3F1EB2CD-076C-49FD-891B-CE588A6566AA}"/>
-          </ac:picMkLst>
-        </pc:picChg>
-      </pc:sldChg>
-      <pc:sldChg chg="addSp delSp modSp add mod">
-        <pc:chgData name="Мария Савинова" userId="e24eaf7e9b1ed84c" providerId="LiveId" clId="{FBA2780E-5BE6-4AEE-8C8C-EA7D3EE18985}" dt="2024-09-23T13:35:03.049" v="2398" actId="20577"/>
-        <pc:sldMkLst>
-          <pc:docMk/>
-          <pc:sldMk cId="1773754508" sldId="271"/>
-        </pc:sldMkLst>
-        <pc:spChg chg="mod">
-          <ac:chgData name="Мария Савинова" userId="e24eaf7e9b1ed84c" providerId="LiveId" clId="{FBA2780E-5BE6-4AEE-8C8C-EA7D3EE18985}" dt="2024-09-23T08:07:23.648" v="1794" actId="255"/>
-          <ac:spMkLst>
-            <pc:docMk/>
-            <pc:sldMk cId="1773754508" sldId="271"/>
-            <ac:spMk id="2" creationId="{00000000-0000-0000-0000-000000000000}"/>
-          </ac:spMkLst>
-        </pc:spChg>
-        <pc:spChg chg="add del mod">
-          <ac:chgData name="Мария Савинова" userId="e24eaf7e9b1ed84c" providerId="LiveId" clId="{FBA2780E-5BE6-4AEE-8C8C-EA7D3EE18985}" dt="2024-09-23T13:35:03.049" v="2398" actId="20577"/>
-          <ac:spMkLst>
-            <pc:docMk/>
-            <pc:sldMk cId="1773754508" sldId="271"/>
-            <ac:spMk id="3" creationId="{00000000-0000-0000-0000-000000000000}"/>
-          </ac:spMkLst>
-        </pc:spChg>
-        <pc:spChg chg="del">
-          <ac:chgData name="Мария Савинова" userId="e24eaf7e9b1ed84c" providerId="LiveId" clId="{FBA2780E-5BE6-4AEE-8C8C-EA7D3EE18985}" dt="2024-09-23T08:06:24.757" v="1769" actId="478"/>
-          <ac:spMkLst>
-            <pc:docMk/>
-            <pc:sldMk cId="1773754508" sldId="271"/>
-            <ac:spMk id="8" creationId="{957AA84F-8897-4933-85BC-FB0080066665}"/>
-          </ac:spMkLst>
-        </pc:spChg>
-        <pc:spChg chg="del">
-          <ac:chgData name="Мария Савинова" userId="e24eaf7e9b1ed84c" providerId="LiveId" clId="{FBA2780E-5BE6-4AEE-8C8C-EA7D3EE18985}" dt="2024-09-23T08:06:22.872" v="1768" actId="478"/>
-          <ac:spMkLst>
-            <pc:docMk/>
-            <pc:sldMk cId="1773754508" sldId="271"/>
-            <ac:spMk id="9" creationId="{791872D6-869B-4CA8-8997-4959251037CA}"/>
-          </ac:spMkLst>
-        </pc:spChg>
-        <pc:picChg chg="add del mod">
-          <ac:chgData name="Мария Савинова" userId="e24eaf7e9b1ed84c" providerId="LiveId" clId="{FBA2780E-5BE6-4AEE-8C8C-EA7D3EE18985}" dt="2024-09-23T08:06:31.055" v="1773"/>
-          <ac:picMkLst>
-            <pc:docMk/>
-            <pc:sldMk cId="1773754508" sldId="271"/>
-            <ac:picMk id="10" creationId="{678AC721-6BA4-411F-BA2E-6D9F59D48B97}"/>
-          </ac:picMkLst>
-        </pc:picChg>
-        <pc:picChg chg="add mod">
-          <ac:chgData name="Мария Савинова" userId="e24eaf7e9b1ed84c" providerId="LiveId" clId="{FBA2780E-5BE6-4AEE-8C8C-EA7D3EE18985}" dt="2024-09-23T08:09:57.257" v="1837" actId="1036"/>
-          <ac:picMkLst>
-            <pc:docMk/>
-            <pc:sldMk cId="1773754508" sldId="271"/>
-            <ac:picMk id="12" creationId="{2A08C81A-2C63-4BEA-AFBC-BCAD96A689FE}"/>
-          </ac:picMkLst>
-        </pc:picChg>
-      </pc:sldChg>
-      <pc:sldChg chg="addSp delSp modSp add mod">
-        <pc:chgData name="Мария Савинова" userId="e24eaf7e9b1ed84c" providerId="LiveId" clId="{FBA2780E-5BE6-4AEE-8C8C-EA7D3EE18985}" dt="2024-09-23T13:59:34.032" v="2782" actId="207"/>
-        <pc:sldMkLst>
-          <pc:docMk/>
-          <pc:sldMk cId="2214237742" sldId="272"/>
-        </pc:sldMkLst>
-        <pc:spChg chg="mod">
-          <ac:chgData name="Мария Савинова" userId="e24eaf7e9b1ed84c" providerId="LiveId" clId="{FBA2780E-5BE6-4AEE-8C8C-EA7D3EE18985}" dt="2024-09-23T13:21:47.680" v="2300" actId="1076"/>
-          <ac:spMkLst>
-            <pc:docMk/>
-            <pc:sldMk cId="2214237742" sldId="272"/>
-            <ac:spMk id="3" creationId="{00000000-0000-0000-0000-000000000000}"/>
-          </ac:spMkLst>
-        </pc:spChg>
-        <pc:spChg chg="add mod">
-          <ac:chgData name="Мария Савинова" userId="e24eaf7e9b1ed84c" providerId="LiveId" clId="{FBA2780E-5BE6-4AEE-8C8C-EA7D3EE18985}" dt="2024-09-23T13:59:34.032" v="2782" actId="207"/>
-          <ac:spMkLst>
-            <pc:docMk/>
-            <pc:sldMk cId="2214237742" sldId="272"/>
-            <ac:spMk id="8" creationId="{426C69A6-A2F1-40A8-B889-C63B1AE0A2E3}"/>
-          </ac:spMkLst>
-        </pc:spChg>
-        <pc:spChg chg="add mod">
-          <ac:chgData name="Мария Савинова" userId="e24eaf7e9b1ed84c" providerId="LiveId" clId="{FBA2780E-5BE6-4AEE-8C8C-EA7D3EE18985}" dt="2024-09-23T13:58:56.964" v="2776" actId="113"/>
-          <ac:spMkLst>
-            <pc:docMk/>
-            <pc:sldMk cId="2214237742" sldId="272"/>
-            <ac:spMk id="10" creationId="{CA34E12E-4C3B-42AE-966D-48234B6733F0}"/>
-          </ac:spMkLst>
-        </pc:spChg>
-        <pc:spChg chg="add mod">
-          <ac:chgData name="Мария Савинова" userId="e24eaf7e9b1ed84c" providerId="LiveId" clId="{FBA2780E-5BE6-4AEE-8C8C-EA7D3EE18985}" dt="2024-09-23T13:21:51.824" v="2301" actId="1076"/>
-          <ac:spMkLst>
-            <pc:docMk/>
-            <pc:sldMk cId="2214237742" sldId="272"/>
-            <ac:spMk id="13" creationId="{8EB44BDF-E5AA-4176-B86D-E881FC5501F9}"/>
-          </ac:spMkLst>
-        </pc:spChg>
-        <pc:picChg chg="del">
-          <ac:chgData name="Мария Савинова" userId="e24eaf7e9b1ed84c" providerId="LiveId" clId="{FBA2780E-5BE6-4AEE-8C8C-EA7D3EE18985}" dt="2024-09-23T13:15:02.408" v="2193" actId="478"/>
-          <ac:picMkLst>
-            <pc:docMk/>
-            <pc:sldMk cId="2214237742" sldId="272"/>
-            <ac:picMk id="12" creationId="{3F1EB2CD-076C-49FD-891B-CE588A6566AA}"/>
-          </ac:picMkLst>
-        </pc:picChg>
-      </pc:sldChg>
-      <pc:sldChg chg="addSp delSp modSp add mod">
-        <pc:chgData name="Мария Савинова" userId="e24eaf7e9b1ed84c" providerId="LiveId" clId="{FBA2780E-5BE6-4AEE-8C8C-EA7D3EE18985}" dt="2024-09-23T13:53:34.678" v="2765" actId="113"/>
-        <pc:sldMkLst>
-          <pc:docMk/>
-          <pc:sldMk cId="1900805023" sldId="273"/>
-        </pc:sldMkLst>
-        <pc:spChg chg="del">
-          <ac:chgData name="Мария Савинова" userId="e24eaf7e9b1ed84c" providerId="LiveId" clId="{FBA2780E-5BE6-4AEE-8C8C-EA7D3EE18985}" dt="2024-09-23T13:45:42.186" v="2576" actId="478"/>
-          <ac:spMkLst>
-            <pc:docMk/>
-            <pc:sldMk cId="1900805023" sldId="273"/>
-            <ac:spMk id="3" creationId="{00000000-0000-0000-0000-000000000000}"/>
-          </ac:spMkLst>
-        </pc:spChg>
-        <pc:spChg chg="add del mod">
-          <ac:chgData name="Мария Савинова" userId="e24eaf7e9b1ed84c" providerId="LiveId" clId="{FBA2780E-5BE6-4AEE-8C8C-EA7D3EE18985}" dt="2024-09-23T13:45:45.964" v="2577" actId="478"/>
-          <ac:spMkLst>
-            <pc:docMk/>
-            <pc:sldMk cId="1900805023" sldId="273"/>
-            <ac:spMk id="8" creationId="{1FBD23D8-F007-43CB-A718-A87BCA6167FF}"/>
-          </ac:spMkLst>
-        </pc:spChg>
-        <pc:spChg chg="add mod">
-          <ac:chgData name="Мария Савинова" userId="e24eaf7e9b1ed84c" providerId="LiveId" clId="{FBA2780E-5BE6-4AEE-8C8C-EA7D3EE18985}" dt="2024-09-23T13:52:03.735" v="2750" actId="1076"/>
-          <ac:spMkLst>
-            <pc:docMk/>
-            <pc:sldMk cId="1900805023" sldId="273"/>
-            <ac:spMk id="10" creationId="{3049AAE2-0EE3-40AC-9FED-85CBE02A672D}"/>
-          </ac:spMkLst>
-        </pc:spChg>
-        <pc:spChg chg="add mod">
-          <ac:chgData name="Мария Савинова" userId="e24eaf7e9b1ed84c" providerId="LiveId" clId="{FBA2780E-5BE6-4AEE-8C8C-EA7D3EE18985}" dt="2024-09-23T13:51:08.949" v="2734" actId="1076"/>
-          <ac:spMkLst>
-            <pc:docMk/>
-            <pc:sldMk cId="1900805023" sldId="273"/>
-            <ac:spMk id="11" creationId="{76337475-23D1-4EB1-8FFC-51C03BD43632}"/>
-          </ac:spMkLst>
-        </pc:spChg>
-        <pc:spChg chg="add del">
-          <ac:chgData name="Мария Савинова" userId="e24eaf7e9b1ed84c" providerId="LiveId" clId="{FBA2780E-5BE6-4AEE-8C8C-EA7D3EE18985}" dt="2024-09-23T13:51:13.459" v="2738" actId="22"/>
-          <ac:spMkLst>
-            <pc:docMk/>
-            <pc:sldMk cId="1900805023" sldId="273"/>
-            <ac:spMk id="13" creationId="{7BAE43B8-F987-4590-8C6D-2C724FB5FD19}"/>
-          </ac:spMkLst>
-        </pc:spChg>
-        <pc:spChg chg="add mod">
-          <ac:chgData name="Мария Савинова" userId="e24eaf7e9b1ed84c" providerId="LiveId" clId="{FBA2780E-5BE6-4AEE-8C8C-EA7D3EE18985}" dt="2024-09-23T13:51:55.972" v="2749" actId="113"/>
-          <ac:spMkLst>
-            <pc:docMk/>
-            <pc:sldMk cId="1900805023" sldId="273"/>
-            <ac:spMk id="15" creationId="{DBBD1D5E-2F8B-470B-BC72-613749FD3CF5}"/>
-          </ac:spMkLst>
-        </pc:spChg>
-        <pc:spChg chg="add mod">
-          <ac:chgData name="Мария Савинова" userId="e24eaf7e9b1ed84c" providerId="LiveId" clId="{FBA2780E-5BE6-4AEE-8C8C-EA7D3EE18985}" dt="2024-09-23T13:53:34.678" v="2765" actId="113"/>
-          <ac:spMkLst>
-            <pc:docMk/>
-            <pc:sldMk cId="1900805023" sldId="273"/>
-            <ac:spMk id="17" creationId="{264D8D5F-531F-41A4-9F4F-09CC7050E985}"/>
-          </ac:spMkLst>
-        </pc:spChg>
-        <pc:picChg chg="del">
-          <ac:chgData name="Мария Савинова" userId="e24eaf7e9b1ed84c" providerId="LiveId" clId="{FBA2780E-5BE6-4AEE-8C8C-EA7D3EE18985}" dt="2024-09-23T13:45:39.527" v="2575" actId="478"/>
-          <ac:picMkLst>
-            <pc:docMk/>
-            <pc:sldMk cId="1900805023" sldId="273"/>
-            <ac:picMk id="12" creationId="{2A08C81A-2C63-4BEA-AFBC-BCAD96A689FE}"/>
-          </ac:picMkLst>
-        </pc:picChg>
-      </pc:sldChg>
-    </pc:docChg>
-  </pc:docChgLst>
-  <pc:docChgLst>
     <pc:chgData name="Мария Савинова" userId="e24eaf7e9b1ed84c" providerId="LiveId" clId="{82BEC481-F629-41F1-95E7-D263E5810322}"/>
     <pc:docChg chg="undo custSel addSld delSld modSld">
       <pc:chgData name="Мария Савинова" userId="e24eaf7e9b1ed84c" providerId="LiveId" clId="{82BEC481-F629-41F1-95E7-D263E5810322}" dt="2024-10-01T08:21:59.027" v="1215" actId="207"/>
@@ -1445,6 +656,858 @@
       </pc:sldChg>
     </pc:docChg>
   </pc:docChgLst>
+  <pc:docChgLst>
+    <pc:chgData name="Мария Савинова" userId="e24eaf7e9b1ed84c" providerId="LiveId" clId="{FBA2780E-5BE6-4AEE-8C8C-EA7D3EE18985}"/>
+    <pc:docChg chg="undo redo custSel addSld delSld modSld sldOrd">
+      <pc:chgData name="Мария Савинова" userId="e24eaf7e9b1ed84c" providerId="LiveId" clId="{FBA2780E-5BE6-4AEE-8C8C-EA7D3EE18985}" dt="2024-09-23T14:03:41.281" v="2951"/>
+      <pc:docMkLst>
+        <pc:docMk/>
+      </pc:docMkLst>
+      <pc:sldChg chg="modSp mod">
+        <pc:chgData name="Мария Савинова" userId="e24eaf7e9b1ed84c" providerId="LiveId" clId="{FBA2780E-5BE6-4AEE-8C8C-EA7D3EE18985}" dt="2024-09-20T22:04:41.987" v="2" actId="2711"/>
+        <pc:sldMkLst>
+          <pc:docMk/>
+          <pc:sldMk cId="967994007" sldId="256"/>
+        </pc:sldMkLst>
+        <pc:spChg chg="mod">
+          <ac:chgData name="Мария Савинова" userId="e24eaf7e9b1ed84c" providerId="LiveId" clId="{FBA2780E-5BE6-4AEE-8C8C-EA7D3EE18985}" dt="2024-09-20T22:04:41.987" v="2" actId="2711"/>
+          <ac:spMkLst>
+            <pc:docMk/>
+            <pc:sldMk cId="967994007" sldId="256"/>
+            <ac:spMk id="2" creationId="{00000000-0000-0000-0000-000000000000}"/>
+          </ac:spMkLst>
+        </pc:spChg>
+      </pc:sldChg>
+      <pc:sldChg chg="modSp mod">
+        <pc:chgData name="Мария Савинова" userId="e24eaf7e9b1ed84c" providerId="LiveId" clId="{FBA2780E-5BE6-4AEE-8C8C-EA7D3EE18985}" dt="2024-09-20T22:30:23.716" v="765" actId="2710"/>
+        <pc:sldMkLst>
+          <pc:docMk/>
+          <pc:sldMk cId="4014811966" sldId="257"/>
+        </pc:sldMkLst>
+        <pc:spChg chg="mod">
+          <ac:chgData name="Мария Савинова" userId="e24eaf7e9b1ed84c" providerId="LiveId" clId="{FBA2780E-5BE6-4AEE-8C8C-EA7D3EE18985}" dt="2024-09-20T22:30:23.716" v="765" actId="2710"/>
+          <ac:spMkLst>
+            <pc:docMk/>
+            <pc:sldMk cId="4014811966" sldId="257"/>
+            <ac:spMk id="3" creationId="{00000000-0000-0000-0000-000000000000}"/>
+          </ac:spMkLst>
+        </pc:spChg>
+      </pc:sldChg>
+      <pc:sldChg chg="addSp delSp modSp mod">
+        <pc:chgData name="Мария Савинова" userId="e24eaf7e9b1ed84c" providerId="LiveId" clId="{FBA2780E-5BE6-4AEE-8C8C-EA7D3EE18985}" dt="2024-09-23T14:01:58.412" v="2927" actId="20577"/>
+        <pc:sldMkLst>
+          <pc:docMk/>
+          <pc:sldMk cId="742912908" sldId="258"/>
+        </pc:sldMkLst>
+        <pc:spChg chg="mod">
+          <ac:chgData name="Мария Савинова" userId="e24eaf7e9b1ed84c" providerId="LiveId" clId="{FBA2780E-5BE6-4AEE-8C8C-EA7D3EE18985}" dt="2024-09-20T22:06:31.655" v="25" actId="113"/>
+          <ac:spMkLst>
+            <pc:docMk/>
+            <pc:sldMk cId="742912908" sldId="258"/>
+            <ac:spMk id="2" creationId="{00000000-0000-0000-0000-000000000000}"/>
+          </ac:spMkLst>
+        </pc:spChg>
+        <pc:spChg chg="mod">
+          <ac:chgData name="Мария Савинова" userId="e24eaf7e9b1ed84c" providerId="LiveId" clId="{FBA2780E-5BE6-4AEE-8C8C-EA7D3EE18985}" dt="2024-09-23T14:01:58.412" v="2927" actId="20577"/>
+          <ac:spMkLst>
+            <pc:docMk/>
+            <pc:sldMk cId="742912908" sldId="258"/>
+            <ac:spMk id="3" creationId="{00000000-0000-0000-0000-000000000000}"/>
+          </ac:spMkLst>
+        </pc:spChg>
+        <pc:spChg chg="add del mod">
+          <ac:chgData name="Мария Савинова" userId="e24eaf7e9b1ed84c" providerId="LiveId" clId="{FBA2780E-5BE6-4AEE-8C8C-EA7D3EE18985}" dt="2024-09-20T22:21:55.870" v="468" actId="1036"/>
+          <ac:spMkLst>
+            <pc:docMk/>
+            <pc:sldMk cId="742912908" sldId="258"/>
+            <ac:spMk id="8" creationId="{143DF86B-0F1D-4327-BA47-4BA88D0280EF}"/>
+          </ac:spMkLst>
+        </pc:spChg>
+        <pc:spChg chg="add del mod">
+          <ac:chgData name="Мария Савинова" userId="e24eaf7e9b1ed84c" providerId="LiveId" clId="{FBA2780E-5BE6-4AEE-8C8C-EA7D3EE18985}" dt="2024-09-20T22:44:32.202" v="1121"/>
+          <ac:spMkLst>
+            <pc:docMk/>
+            <pc:sldMk cId="742912908" sldId="258"/>
+            <ac:spMk id="9" creationId="{8FAC235C-B49B-40FD-A71D-CEF085AC2F61}"/>
+          </ac:spMkLst>
+        </pc:spChg>
+        <pc:spChg chg="add del mod">
+          <ac:chgData name="Мария Савинова" userId="e24eaf7e9b1ed84c" providerId="LiveId" clId="{FBA2780E-5BE6-4AEE-8C8C-EA7D3EE18985}" dt="2024-09-20T22:18:36.721" v="359" actId="478"/>
+          <ac:spMkLst>
+            <pc:docMk/>
+            <pc:sldMk cId="742912908" sldId="258"/>
+            <ac:spMk id="10" creationId="{159B5573-2CA5-4320-AFF0-1FFBB07A7CA5}"/>
+          </ac:spMkLst>
+        </pc:spChg>
+      </pc:sldChg>
+      <pc:sldChg chg="modSp add mod">
+        <pc:chgData name="Мария Савинова" userId="e24eaf7e9b1ed84c" providerId="LiveId" clId="{FBA2780E-5BE6-4AEE-8C8C-EA7D3EE18985}" dt="2024-09-23T14:02:05.745" v="2928" actId="20577"/>
+        <pc:sldMkLst>
+          <pc:docMk/>
+          <pc:sldMk cId="2839600060" sldId="259"/>
+        </pc:sldMkLst>
+        <pc:spChg chg="mod">
+          <ac:chgData name="Мария Савинова" userId="e24eaf7e9b1ed84c" providerId="LiveId" clId="{FBA2780E-5BE6-4AEE-8C8C-EA7D3EE18985}" dt="2024-09-20T22:06:43.243" v="38" actId="20577"/>
+          <ac:spMkLst>
+            <pc:docMk/>
+            <pc:sldMk cId="2839600060" sldId="259"/>
+            <ac:spMk id="2" creationId="{00000000-0000-0000-0000-000000000000}"/>
+          </ac:spMkLst>
+        </pc:spChg>
+        <pc:spChg chg="mod">
+          <ac:chgData name="Мария Савинова" userId="e24eaf7e9b1ed84c" providerId="LiveId" clId="{FBA2780E-5BE6-4AEE-8C8C-EA7D3EE18985}" dt="2024-09-23T14:02:05.745" v="2928" actId="20577"/>
+          <ac:spMkLst>
+            <pc:docMk/>
+            <pc:sldMk cId="2839600060" sldId="259"/>
+            <ac:spMk id="3" creationId="{00000000-0000-0000-0000-000000000000}"/>
+          </ac:spMkLst>
+        </pc:spChg>
+      </pc:sldChg>
+      <pc:sldChg chg="addSp delSp modSp add mod">
+        <pc:chgData name="Мария Савинова" userId="e24eaf7e9b1ed84c" providerId="LiveId" clId="{FBA2780E-5BE6-4AEE-8C8C-EA7D3EE18985}" dt="2024-09-23T14:02:16.177" v="2932" actId="20577"/>
+        <pc:sldMkLst>
+          <pc:docMk/>
+          <pc:sldMk cId="1758739892" sldId="260"/>
+        </pc:sldMkLst>
+        <pc:spChg chg="mod">
+          <ac:chgData name="Мария Савинова" userId="e24eaf7e9b1ed84c" providerId="LiveId" clId="{FBA2780E-5BE6-4AEE-8C8C-EA7D3EE18985}" dt="2024-09-20T22:25:43.261" v="678" actId="20577"/>
+          <ac:spMkLst>
+            <pc:docMk/>
+            <pc:sldMk cId="1758739892" sldId="260"/>
+            <ac:spMk id="2" creationId="{00000000-0000-0000-0000-000000000000}"/>
+          </ac:spMkLst>
+        </pc:spChg>
+        <pc:spChg chg="mod">
+          <ac:chgData name="Мария Савинова" userId="e24eaf7e9b1ed84c" providerId="LiveId" clId="{FBA2780E-5BE6-4AEE-8C8C-EA7D3EE18985}" dt="2024-09-23T14:02:16.177" v="2932" actId="20577"/>
+          <ac:spMkLst>
+            <pc:docMk/>
+            <pc:sldMk cId="1758739892" sldId="260"/>
+            <ac:spMk id="3" creationId="{00000000-0000-0000-0000-000000000000}"/>
+          </ac:spMkLst>
+        </pc:spChg>
+        <pc:spChg chg="mod">
+          <ac:chgData name="Мария Савинова" userId="e24eaf7e9b1ed84c" providerId="LiveId" clId="{FBA2780E-5BE6-4AEE-8C8C-EA7D3EE18985}" dt="2024-09-23T08:20:51.586" v="1942" actId="2711"/>
+          <ac:spMkLst>
+            <pc:docMk/>
+            <pc:sldMk cId="1758739892" sldId="260"/>
+            <ac:spMk id="4" creationId="{00000000-0000-0000-0000-000000000000}"/>
+          </ac:spMkLst>
+        </pc:spChg>
+        <pc:spChg chg="add del mod">
+          <ac:chgData name="Мария Савинова" userId="e24eaf7e9b1ed84c" providerId="LiveId" clId="{FBA2780E-5BE6-4AEE-8C8C-EA7D3EE18985}" dt="2024-09-20T22:25:01.200" v="596"/>
+          <ac:spMkLst>
+            <pc:docMk/>
+            <pc:sldMk cId="1758739892" sldId="260"/>
+            <ac:spMk id="8" creationId="{E5EF931D-D382-4C75-99AA-41E8EC200C70}"/>
+          </ac:spMkLst>
+        </pc:spChg>
+        <pc:spChg chg="add del mod">
+          <ac:chgData name="Мария Савинова" userId="e24eaf7e9b1ed84c" providerId="LiveId" clId="{FBA2780E-5BE6-4AEE-8C8C-EA7D3EE18985}" dt="2024-09-20T22:25:01.200" v="596"/>
+          <ac:spMkLst>
+            <pc:docMk/>
+            <pc:sldMk cId="1758739892" sldId="260"/>
+            <ac:spMk id="9" creationId="{D9F10936-68B0-447C-B532-CEBDE6B1B911}"/>
+          </ac:spMkLst>
+        </pc:spChg>
+        <pc:spChg chg="add del mod">
+          <ac:chgData name="Мария Савинова" userId="e24eaf7e9b1ed84c" providerId="LiveId" clId="{FBA2780E-5BE6-4AEE-8C8C-EA7D3EE18985}" dt="2024-09-20T22:26:00.207" v="697" actId="478"/>
+          <ac:spMkLst>
+            <pc:docMk/>
+            <pc:sldMk cId="1758739892" sldId="260"/>
+            <ac:spMk id="10" creationId="{F77BE8FF-22FF-43AE-A5D6-3DDD19AEF4C3}"/>
+          </ac:spMkLst>
+        </pc:spChg>
+        <pc:spChg chg="add del mod">
+          <ac:chgData name="Мария Савинова" userId="e24eaf7e9b1ed84c" providerId="LiveId" clId="{FBA2780E-5BE6-4AEE-8C8C-EA7D3EE18985}" dt="2024-09-20T22:26:00.207" v="697" actId="478"/>
+          <ac:spMkLst>
+            <pc:docMk/>
+            <pc:sldMk cId="1758739892" sldId="260"/>
+            <ac:spMk id="11" creationId="{A4E96537-5032-42E5-853F-EF68D0D0E2F9}"/>
+          </ac:spMkLst>
+        </pc:spChg>
+      </pc:sldChg>
+      <pc:sldChg chg="addSp delSp modSp add mod">
+        <pc:chgData name="Мария Савинова" userId="e24eaf7e9b1ed84c" providerId="LiveId" clId="{FBA2780E-5BE6-4AEE-8C8C-EA7D3EE18985}" dt="2024-09-23T08:21:07.949" v="1944" actId="2711"/>
+        <pc:sldMkLst>
+          <pc:docMk/>
+          <pc:sldMk cId="600860783" sldId="261"/>
+        </pc:sldMkLst>
+        <pc:spChg chg="mod">
+          <ac:chgData name="Мария Савинова" userId="e24eaf7e9b1ed84c" providerId="LiveId" clId="{FBA2780E-5BE6-4AEE-8C8C-EA7D3EE18985}" dt="2024-09-20T22:45:27.292" v="1153" actId="20577"/>
+          <ac:spMkLst>
+            <pc:docMk/>
+            <pc:sldMk cId="600860783" sldId="261"/>
+            <ac:spMk id="2" creationId="{00000000-0000-0000-0000-000000000000}"/>
+          </ac:spMkLst>
+        </pc:spChg>
+        <pc:spChg chg="add del mod">
+          <ac:chgData name="Мария Савинова" userId="e24eaf7e9b1ed84c" providerId="LiveId" clId="{FBA2780E-5BE6-4AEE-8C8C-EA7D3EE18985}" dt="2024-09-20T23:04:42.008" v="1579" actId="207"/>
+          <ac:spMkLst>
+            <pc:docMk/>
+            <pc:sldMk cId="600860783" sldId="261"/>
+            <ac:spMk id="3" creationId="{00000000-0000-0000-0000-000000000000}"/>
+          </ac:spMkLst>
+        </pc:spChg>
+        <pc:spChg chg="mod">
+          <ac:chgData name="Мария Савинова" userId="e24eaf7e9b1ed84c" providerId="LiveId" clId="{FBA2780E-5BE6-4AEE-8C8C-EA7D3EE18985}" dt="2024-09-23T08:21:07.949" v="1944" actId="2711"/>
+          <ac:spMkLst>
+            <pc:docMk/>
+            <pc:sldMk cId="600860783" sldId="261"/>
+            <ac:spMk id="4" creationId="{00000000-0000-0000-0000-000000000000}"/>
+          </ac:spMkLst>
+        </pc:spChg>
+        <pc:spChg chg="add del mod">
+          <ac:chgData name="Мария Савинова" userId="e24eaf7e9b1ed84c" providerId="LiveId" clId="{FBA2780E-5BE6-4AEE-8C8C-EA7D3EE18985}" dt="2024-09-20T22:43:15.747" v="1100" actId="22"/>
+          <ac:spMkLst>
+            <pc:docMk/>
+            <pc:sldMk cId="600860783" sldId="261"/>
+            <ac:spMk id="14" creationId="{03A4D306-268D-421A-9429-E8A6D3A0783E}"/>
+          </ac:spMkLst>
+        </pc:spChg>
+        <pc:spChg chg="add del mod">
+          <ac:chgData name="Мария Савинова" userId="e24eaf7e9b1ed84c" providerId="LiveId" clId="{FBA2780E-5BE6-4AEE-8C8C-EA7D3EE18985}" dt="2024-09-20T22:43:13.526" v="1095"/>
+          <ac:spMkLst>
+            <pc:docMk/>
+            <pc:sldMk cId="600860783" sldId="261"/>
+            <ac:spMk id="15" creationId="{DB7FD0E9-6E8E-4AD9-9700-12C9E66382F4}"/>
+          </ac:spMkLst>
+        </pc:spChg>
+        <pc:spChg chg="add del mod">
+          <ac:chgData name="Мария Савинова" userId="e24eaf7e9b1ed84c" providerId="LiveId" clId="{FBA2780E-5BE6-4AEE-8C8C-EA7D3EE18985}" dt="2024-09-20T22:49:11.893" v="1215" actId="478"/>
+          <ac:spMkLst>
+            <pc:docMk/>
+            <pc:sldMk cId="600860783" sldId="261"/>
+            <ac:spMk id="17" creationId="{DBBE5F54-A7B2-4FFC-9E6D-ADEAC307AF61}"/>
+          </ac:spMkLst>
+        </pc:spChg>
+        <pc:spChg chg="add del mod">
+          <ac:chgData name="Мария Савинова" userId="e24eaf7e9b1ed84c" providerId="LiveId" clId="{FBA2780E-5BE6-4AEE-8C8C-EA7D3EE18985}" dt="2024-09-20T22:49:11.893" v="1215" actId="478"/>
+          <ac:spMkLst>
+            <pc:docMk/>
+            <pc:sldMk cId="600860783" sldId="261"/>
+            <ac:spMk id="18" creationId="{FE6A15AD-9C16-4693-B2BE-234F6D9BDF29}"/>
+          </ac:spMkLst>
+        </pc:spChg>
+        <pc:picChg chg="add del mod ord">
+          <ac:chgData name="Мария Савинова" userId="e24eaf7e9b1ed84c" providerId="LiveId" clId="{FBA2780E-5BE6-4AEE-8C8C-EA7D3EE18985}" dt="2024-09-20T22:39:02.526" v="1026" actId="22"/>
+          <ac:picMkLst>
+            <pc:docMk/>
+            <pc:sldMk cId="600860783" sldId="261"/>
+            <ac:picMk id="8" creationId="{EDED9590-9BC3-44DD-8E6F-35CDD821EC56}"/>
+          </ac:picMkLst>
+        </pc:picChg>
+        <pc:picChg chg="add del mod modCrop">
+          <ac:chgData name="Мария Савинова" userId="e24eaf7e9b1ed84c" providerId="LiveId" clId="{FBA2780E-5BE6-4AEE-8C8C-EA7D3EE18985}" dt="2024-09-20T22:39:57.028" v="1037" actId="478"/>
+          <ac:picMkLst>
+            <pc:docMk/>
+            <pc:sldMk cId="600860783" sldId="261"/>
+            <ac:picMk id="10" creationId="{E6ECBEEB-DB74-4815-83F6-DA099BFF09E4}"/>
+          </ac:picMkLst>
+        </pc:picChg>
+        <pc:picChg chg="add mod">
+          <ac:chgData name="Мария Савинова" userId="e24eaf7e9b1ed84c" providerId="LiveId" clId="{FBA2780E-5BE6-4AEE-8C8C-EA7D3EE18985}" dt="2024-09-20T23:04:36.707" v="1578" actId="1076"/>
+          <ac:picMkLst>
+            <pc:docMk/>
+            <pc:sldMk cId="600860783" sldId="261"/>
+            <ac:picMk id="12" creationId="{3C7851B5-3554-480E-BE26-3BB8F8EB47A8}"/>
+          </ac:picMkLst>
+        </pc:picChg>
+      </pc:sldChg>
+      <pc:sldChg chg="addSp delSp modSp add mod">
+        <pc:chgData name="Мария Савинова" userId="e24eaf7e9b1ed84c" providerId="LiveId" clId="{FBA2780E-5BE6-4AEE-8C8C-EA7D3EE18985}" dt="2024-09-23T14:03:06.125" v="2948" actId="20577"/>
+        <pc:sldMkLst>
+          <pc:docMk/>
+          <pc:sldMk cId="2293707358" sldId="262"/>
+        </pc:sldMkLst>
+        <pc:spChg chg="mod">
+          <ac:chgData name="Мария Савинова" userId="e24eaf7e9b1ed84c" providerId="LiveId" clId="{FBA2780E-5BE6-4AEE-8C8C-EA7D3EE18985}" dt="2024-09-20T22:49:34.578" v="1229" actId="255"/>
+          <ac:spMkLst>
+            <pc:docMk/>
+            <pc:sldMk cId="2293707358" sldId="262"/>
+            <ac:spMk id="2" creationId="{00000000-0000-0000-0000-000000000000}"/>
+          </ac:spMkLst>
+        </pc:spChg>
+        <pc:spChg chg="mod">
+          <ac:chgData name="Мария Савинова" userId="e24eaf7e9b1ed84c" providerId="LiveId" clId="{FBA2780E-5BE6-4AEE-8C8C-EA7D3EE18985}" dt="2024-09-23T14:03:06.125" v="2948" actId="20577"/>
+          <ac:spMkLst>
+            <pc:docMk/>
+            <pc:sldMk cId="2293707358" sldId="262"/>
+            <ac:spMk id="3" creationId="{00000000-0000-0000-0000-000000000000}"/>
+          </ac:spMkLst>
+        </pc:spChg>
+        <pc:spChg chg="add del mod">
+          <ac:chgData name="Мария Савинова" userId="e24eaf7e9b1ed84c" providerId="LiveId" clId="{FBA2780E-5BE6-4AEE-8C8C-EA7D3EE18985}" dt="2024-09-23T08:39:08.653" v="2004" actId="478"/>
+          <ac:spMkLst>
+            <pc:docMk/>
+            <pc:sldMk cId="2293707358" sldId="262"/>
+            <ac:spMk id="8" creationId="{D4C95291-2C23-4352-BCC0-5C4F93100524}"/>
+          </ac:spMkLst>
+        </pc:spChg>
+        <pc:spChg chg="add del mod">
+          <ac:chgData name="Мария Савинова" userId="e24eaf7e9b1ed84c" providerId="LiveId" clId="{FBA2780E-5BE6-4AEE-8C8C-EA7D3EE18985}" dt="2024-09-23T08:39:10.841" v="2005" actId="478"/>
+          <ac:spMkLst>
+            <pc:docMk/>
+            <pc:sldMk cId="2293707358" sldId="262"/>
+            <ac:spMk id="9" creationId="{B11FA133-F035-4245-8E62-A414ADF52242}"/>
+          </ac:spMkLst>
+        </pc:spChg>
+        <pc:spChg chg="add del mod">
+          <ac:chgData name="Мария Савинова" userId="e24eaf7e9b1ed84c" providerId="LiveId" clId="{FBA2780E-5BE6-4AEE-8C8C-EA7D3EE18985}" dt="2024-09-20T22:52:37.463" v="1304" actId="478"/>
+          <ac:spMkLst>
+            <pc:docMk/>
+            <pc:sldMk cId="2293707358" sldId="262"/>
+            <ac:spMk id="10" creationId="{C6319FCC-5266-4C84-9F8A-38F424A8EDAA}"/>
+          </ac:spMkLst>
+        </pc:spChg>
+      </pc:sldChg>
+      <pc:sldChg chg="addSp modSp add mod">
+        <pc:chgData name="Мария Савинова" userId="e24eaf7e9b1ed84c" providerId="LiveId" clId="{FBA2780E-5BE6-4AEE-8C8C-EA7D3EE18985}" dt="2024-09-23T14:03:19.646" v="2949"/>
+        <pc:sldMkLst>
+          <pc:docMk/>
+          <pc:sldMk cId="3632604304" sldId="263"/>
+        </pc:sldMkLst>
+        <pc:spChg chg="mod">
+          <ac:chgData name="Мария Савинова" userId="e24eaf7e9b1ed84c" providerId="LiveId" clId="{FBA2780E-5BE6-4AEE-8C8C-EA7D3EE18985}" dt="2024-09-20T22:53:24.063" v="1323" actId="255"/>
+          <ac:spMkLst>
+            <pc:docMk/>
+            <pc:sldMk cId="3632604304" sldId="263"/>
+            <ac:spMk id="2" creationId="{00000000-0000-0000-0000-000000000000}"/>
+          </ac:spMkLst>
+        </pc:spChg>
+        <pc:spChg chg="mod">
+          <ac:chgData name="Мария Савинова" userId="e24eaf7e9b1ed84c" providerId="LiveId" clId="{FBA2780E-5BE6-4AEE-8C8C-EA7D3EE18985}" dt="2024-09-23T13:49:24.098" v="2726" actId="20577"/>
+          <ac:spMkLst>
+            <pc:docMk/>
+            <pc:sldMk cId="3632604304" sldId="263"/>
+            <ac:spMk id="3" creationId="{00000000-0000-0000-0000-000000000000}"/>
+          </ac:spMkLst>
+        </pc:spChg>
+        <pc:spChg chg="mod">
+          <ac:chgData name="Мария Савинова" userId="e24eaf7e9b1ed84c" providerId="LiveId" clId="{FBA2780E-5BE6-4AEE-8C8C-EA7D3EE18985}" dt="2024-09-23T08:20:45.596" v="1941" actId="2711"/>
+          <ac:spMkLst>
+            <pc:docMk/>
+            <pc:sldMk cId="3632604304" sldId="263"/>
+            <ac:spMk id="4" creationId="{00000000-0000-0000-0000-000000000000}"/>
+          </ac:spMkLst>
+        </pc:spChg>
+        <pc:spChg chg="add mod">
+          <ac:chgData name="Мария Савинова" userId="e24eaf7e9b1ed84c" providerId="LiveId" clId="{FBA2780E-5BE6-4AEE-8C8C-EA7D3EE18985}" dt="2024-09-23T14:03:19.646" v="2949"/>
+          <ac:spMkLst>
+            <pc:docMk/>
+            <pc:sldMk cId="3632604304" sldId="263"/>
+            <ac:spMk id="10" creationId="{06F7FA00-9462-463A-82F0-CF3D67B70160}"/>
+          </ac:spMkLst>
+        </pc:spChg>
+        <pc:spChg chg="add mod">
+          <ac:chgData name="Мария Савинова" userId="e24eaf7e9b1ed84c" providerId="LiveId" clId="{FBA2780E-5BE6-4AEE-8C8C-EA7D3EE18985}" dt="2024-09-23T13:39:01.682" v="2402" actId="207"/>
+          <ac:spMkLst>
+            <pc:docMk/>
+            <pc:sldMk cId="3632604304" sldId="263"/>
+            <ac:spMk id="11" creationId="{0E686081-C68F-4292-B742-E5FC2F20847F}"/>
+          </ac:spMkLst>
+        </pc:spChg>
+        <pc:picChg chg="add mod">
+          <ac:chgData name="Мария Савинова" userId="e24eaf7e9b1ed84c" providerId="LiveId" clId="{FBA2780E-5BE6-4AEE-8C8C-EA7D3EE18985}" dt="2024-09-23T08:42:35.716" v="2134" actId="1076"/>
+          <ac:picMkLst>
+            <pc:docMk/>
+            <pc:sldMk cId="3632604304" sldId="263"/>
+            <ac:picMk id="8" creationId="{A51CFDCE-016F-46DE-A41A-3E752F019132}"/>
+          </ac:picMkLst>
+        </pc:picChg>
+      </pc:sldChg>
+      <pc:sldChg chg="modSp add mod">
+        <pc:chgData name="Мария Савинова" userId="e24eaf7e9b1ed84c" providerId="LiveId" clId="{FBA2780E-5BE6-4AEE-8C8C-EA7D3EE18985}" dt="2024-09-23T14:03:27.960" v="2950"/>
+        <pc:sldMkLst>
+          <pc:docMk/>
+          <pc:sldMk cId="36148254" sldId="264"/>
+        </pc:sldMkLst>
+        <pc:spChg chg="mod">
+          <ac:chgData name="Мария Савинова" userId="e24eaf7e9b1ed84c" providerId="LiveId" clId="{FBA2780E-5BE6-4AEE-8C8C-EA7D3EE18985}" dt="2024-09-23T13:38:38.254" v="2400" actId="20577"/>
+          <ac:spMkLst>
+            <pc:docMk/>
+            <pc:sldMk cId="36148254" sldId="264"/>
+            <ac:spMk id="2" creationId="{00000000-0000-0000-0000-000000000000}"/>
+          </ac:spMkLst>
+        </pc:spChg>
+        <pc:spChg chg="mod">
+          <ac:chgData name="Мария Савинова" userId="e24eaf7e9b1ed84c" providerId="LiveId" clId="{FBA2780E-5BE6-4AEE-8C8C-EA7D3EE18985}" dt="2024-09-23T14:03:27.960" v="2950"/>
+          <ac:spMkLst>
+            <pc:docMk/>
+            <pc:sldMk cId="36148254" sldId="264"/>
+            <ac:spMk id="3" creationId="{00000000-0000-0000-0000-000000000000}"/>
+          </ac:spMkLst>
+        </pc:spChg>
+      </pc:sldChg>
+      <pc:sldChg chg="addSp delSp modSp add mod">
+        <pc:chgData name="Мария Савинова" userId="e24eaf7e9b1ed84c" providerId="LiveId" clId="{FBA2780E-5BE6-4AEE-8C8C-EA7D3EE18985}" dt="2024-09-23T14:03:41.281" v="2951"/>
+        <pc:sldMkLst>
+          <pc:docMk/>
+          <pc:sldMk cId="2299204813" sldId="265"/>
+        </pc:sldMkLst>
+        <pc:spChg chg="mod">
+          <ac:chgData name="Мария Савинова" userId="e24eaf7e9b1ed84c" providerId="LiveId" clId="{FBA2780E-5BE6-4AEE-8C8C-EA7D3EE18985}" dt="2024-09-20T23:02:01.286" v="1535" actId="20577"/>
+          <ac:spMkLst>
+            <pc:docMk/>
+            <pc:sldMk cId="2299204813" sldId="265"/>
+            <ac:spMk id="2" creationId="{00000000-0000-0000-0000-000000000000}"/>
+          </ac:spMkLst>
+        </pc:spChg>
+        <pc:spChg chg="mod">
+          <ac:chgData name="Мария Савинова" userId="e24eaf7e9b1ed84c" providerId="LiveId" clId="{FBA2780E-5BE6-4AEE-8C8C-EA7D3EE18985}" dt="2024-09-23T14:03:41.281" v="2951"/>
+          <ac:spMkLst>
+            <pc:docMk/>
+            <pc:sldMk cId="2299204813" sldId="265"/>
+            <ac:spMk id="3" creationId="{00000000-0000-0000-0000-000000000000}"/>
+          </ac:spMkLst>
+        </pc:spChg>
+        <pc:spChg chg="add del mod">
+          <ac:chgData name="Мария Савинова" userId="e24eaf7e9b1ed84c" providerId="LiveId" clId="{FBA2780E-5BE6-4AEE-8C8C-EA7D3EE18985}" dt="2024-09-23T13:46:24.868" v="2585"/>
+          <ac:spMkLst>
+            <pc:docMk/>
+            <pc:sldMk cId="2299204813" sldId="265"/>
+            <ac:spMk id="6" creationId="{DFD64BB7-3ADF-4F6F-B34B-E853B4C08AB8}"/>
+          </ac:spMkLst>
+        </pc:spChg>
+        <pc:spChg chg="add del mod">
+          <ac:chgData name="Мария Савинова" userId="e24eaf7e9b1ed84c" providerId="LiveId" clId="{FBA2780E-5BE6-4AEE-8C8C-EA7D3EE18985}" dt="2024-09-23T13:45:59.652" v="2579" actId="478"/>
+          <ac:spMkLst>
+            <pc:docMk/>
+            <pc:sldMk cId="2299204813" sldId="265"/>
+            <ac:spMk id="8" creationId="{957AA84F-8897-4933-85BC-FB0080066665}"/>
+          </ac:spMkLst>
+        </pc:spChg>
+        <pc:spChg chg="add del mod">
+          <ac:chgData name="Мария Савинова" userId="e24eaf7e9b1ed84c" providerId="LiveId" clId="{FBA2780E-5BE6-4AEE-8C8C-EA7D3EE18985}" dt="2024-09-23T13:46:01.733" v="2580" actId="478"/>
+          <ac:spMkLst>
+            <pc:docMk/>
+            <pc:sldMk cId="2299204813" sldId="265"/>
+            <ac:spMk id="9" creationId="{791872D6-869B-4CA8-8997-4959251037CA}"/>
+          </ac:spMkLst>
+        </pc:spChg>
+        <pc:spChg chg="add del mod">
+          <ac:chgData name="Мария Савинова" userId="e24eaf7e9b1ed84c" providerId="LiveId" clId="{FBA2780E-5BE6-4AEE-8C8C-EA7D3EE18985}" dt="2024-09-23T13:46:24.868" v="2585"/>
+          <ac:spMkLst>
+            <pc:docMk/>
+            <pc:sldMk cId="2299204813" sldId="265"/>
+            <ac:spMk id="10" creationId="{5C0C52F8-DAF1-4428-9A84-853511E00A4B}"/>
+          </ac:spMkLst>
+        </pc:spChg>
+      </pc:sldChg>
+      <pc:sldChg chg="delSp modSp add mod">
+        <pc:chgData name="Мария Савинова" userId="e24eaf7e9b1ed84c" providerId="LiveId" clId="{FBA2780E-5BE6-4AEE-8C8C-EA7D3EE18985}" dt="2024-09-20T23:09:44.555" v="1702" actId="1076"/>
+        <pc:sldMkLst>
+          <pc:docMk/>
+          <pc:sldMk cId="3474348753" sldId="266"/>
+        </pc:sldMkLst>
+        <pc:spChg chg="del mod">
+          <ac:chgData name="Мария Савинова" userId="e24eaf7e9b1ed84c" providerId="LiveId" clId="{FBA2780E-5BE6-4AEE-8C8C-EA7D3EE18985}" dt="2024-09-20T22:12:05.625" v="116" actId="478"/>
+          <ac:spMkLst>
+            <pc:docMk/>
+            <pc:sldMk cId="3474348753" sldId="266"/>
+            <ac:spMk id="2" creationId="{00000000-0000-0000-0000-000000000000}"/>
+          </ac:spMkLst>
+        </pc:spChg>
+        <pc:spChg chg="mod">
+          <ac:chgData name="Мария Савинова" userId="e24eaf7e9b1ed84c" providerId="LiveId" clId="{FBA2780E-5BE6-4AEE-8C8C-EA7D3EE18985}" dt="2024-09-20T23:09:44.555" v="1702" actId="1076"/>
+          <ac:spMkLst>
+            <pc:docMk/>
+            <pc:sldMk cId="3474348753" sldId="266"/>
+            <ac:spMk id="3" creationId="{00000000-0000-0000-0000-000000000000}"/>
+          </ac:spMkLst>
+        </pc:spChg>
+      </pc:sldChg>
+      <pc:sldChg chg="add del">
+        <pc:chgData name="Мария Савинова" userId="e24eaf7e9b1ed84c" providerId="LiveId" clId="{FBA2780E-5BE6-4AEE-8C8C-EA7D3EE18985}" dt="2024-09-20T22:44:24.906" v="1119" actId="47"/>
+        <pc:sldMkLst>
+          <pc:docMk/>
+          <pc:sldMk cId="1581301969" sldId="267"/>
+        </pc:sldMkLst>
+      </pc:sldChg>
+      <pc:sldChg chg="addSp modSp add del mod">
+        <pc:chgData name="Мария Савинова" userId="e24eaf7e9b1ed84c" providerId="LiveId" clId="{FBA2780E-5BE6-4AEE-8C8C-EA7D3EE18985}" dt="2024-09-20T22:38:48.706" v="1024" actId="47"/>
+        <pc:sldMkLst>
+          <pc:docMk/>
+          <pc:sldMk cId="3762584318" sldId="267"/>
+        </pc:sldMkLst>
+        <pc:spChg chg="mod">
+          <ac:chgData name="Мария Савинова" userId="e24eaf7e9b1ed84c" providerId="LiveId" clId="{FBA2780E-5BE6-4AEE-8C8C-EA7D3EE18985}" dt="2024-09-20T22:38:27.029" v="1023" actId="20577"/>
+          <ac:spMkLst>
+            <pc:docMk/>
+            <pc:sldMk cId="3762584318" sldId="267"/>
+            <ac:spMk id="3" creationId="{00000000-0000-0000-0000-000000000000}"/>
+          </ac:spMkLst>
+        </pc:spChg>
+        <pc:picChg chg="add mod modCrop">
+          <ac:chgData name="Мария Савинова" userId="e24eaf7e9b1ed84c" providerId="LiveId" clId="{FBA2780E-5BE6-4AEE-8C8C-EA7D3EE18985}" dt="2024-09-20T22:38:08.304" v="1019" actId="14100"/>
+          <ac:picMkLst>
+            <pc:docMk/>
+            <pc:sldMk cId="3762584318" sldId="267"/>
+            <ac:picMk id="8" creationId="{4445FA39-BB8E-41B6-B13A-2DF3C2EC95AE}"/>
+          </ac:picMkLst>
+        </pc:picChg>
+      </pc:sldChg>
+      <pc:sldChg chg="addSp delSp modSp add mod ord">
+        <pc:chgData name="Мария Савинова" userId="e24eaf7e9b1ed84c" providerId="LiveId" clId="{FBA2780E-5BE6-4AEE-8C8C-EA7D3EE18985}" dt="2024-09-23T14:02:32.432" v="2935" actId="14100"/>
+        <pc:sldMkLst>
+          <pc:docMk/>
+          <pc:sldMk cId="3551373186" sldId="268"/>
+        </pc:sldMkLst>
+        <pc:spChg chg="mod">
+          <ac:chgData name="Мария Савинова" userId="e24eaf7e9b1ed84c" providerId="LiveId" clId="{FBA2780E-5BE6-4AEE-8C8C-EA7D3EE18985}" dt="2024-09-20T22:44:11.789" v="1118"/>
+          <ac:spMkLst>
+            <pc:docMk/>
+            <pc:sldMk cId="3551373186" sldId="268"/>
+            <ac:spMk id="2" creationId="{00000000-0000-0000-0000-000000000000}"/>
+          </ac:spMkLst>
+        </pc:spChg>
+        <pc:spChg chg="mod">
+          <ac:chgData name="Мария Савинова" userId="e24eaf7e9b1ed84c" providerId="LiveId" clId="{FBA2780E-5BE6-4AEE-8C8C-EA7D3EE18985}" dt="2024-09-23T14:02:24.134" v="2933" actId="20577"/>
+          <ac:spMkLst>
+            <pc:docMk/>
+            <pc:sldMk cId="3551373186" sldId="268"/>
+            <ac:spMk id="3" creationId="{00000000-0000-0000-0000-000000000000}"/>
+          </ac:spMkLst>
+        </pc:spChg>
+        <pc:spChg chg="mod">
+          <ac:chgData name="Мария Савинова" userId="e24eaf7e9b1ed84c" providerId="LiveId" clId="{FBA2780E-5BE6-4AEE-8C8C-EA7D3EE18985}" dt="2024-09-23T08:21:02.966" v="1943" actId="2711"/>
+          <ac:spMkLst>
+            <pc:docMk/>
+            <pc:sldMk cId="3551373186" sldId="268"/>
+            <ac:spMk id="4" creationId="{00000000-0000-0000-0000-000000000000}"/>
+          </ac:spMkLst>
+        </pc:spChg>
+        <pc:spChg chg="add del mod">
+          <ac:chgData name="Мария Савинова" userId="e24eaf7e9b1ed84c" providerId="LiveId" clId="{FBA2780E-5BE6-4AEE-8C8C-EA7D3EE18985}" dt="2024-09-20T22:47:30.081" v="1195" actId="22"/>
+          <ac:spMkLst>
+            <pc:docMk/>
+            <pc:sldMk cId="3551373186" sldId="268"/>
+            <ac:spMk id="11" creationId="{EC1EB092-D82C-4A8B-B0AD-9AE1ECC5B533}"/>
+          </ac:spMkLst>
+        </pc:spChg>
+        <pc:picChg chg="add mod modCrop">
+          <ac:chgData name="Мария Савинова" userId="e24eaf7e9b1ed84c" providerId="LiveId" clId="{FBA2780E-5BE6-4AEE-8C8C-EA7D3EE18985}" dt="2024-09-23T14:02:32.432" v="2935" actId="14100"/>
+          <ac:picMkLst>
+            <pc:docMk/>
+            <pc:sldMk cId="3551373186" sldId="268"/>
+            <ac:picMk id="8" creationId="{D8BA093B-DDAC-4953-BA84-FAB983FB2288}"/>
+          </ac:picMkLst>
+        </pc:picChg>
+        <pc:picChg chg="del">
+          <ac:chgData name="Мария Савинова" userId="e24eaf7e9b1ed84c" providerId="LiveId" clId="{FBA2780E-5BE6-4AEE-8C8C-EA7D3EE18985}" dt="2024-09-20T22:45:42.148" v="1154" actId="478"/>
+          <ac:picMkLst>
+            <pc:docMk/>
+            <pc:sldMk cId="3551373186" sldId="268"/>
+            <ac:picMk id="12" creationId="{3C7851B5-3554-480E-BE26-3BB8F8EB47A8}"/>
+          </ac:picMkLst>
+        </pc:picChg>
+      </pc:sldChg>
+      <pc:sldChg chg="modSp add mod">
+        <pc:chgData name="Мария Савинова" userId="e24eaf7e9b1ed84c" providerId="LiveId" clId="{FBA2780E-5BE6-4AEE-8C8C-EA7D3EE18985}" dt="2024-09-23T14:01:22.979" v="2926" actId="207"/>
+        <pc:sldMkLst>
+          <pc:docMk/>
+          <pc:sldMk cId="2023720995" sldId="269"/>
+        </pc:sldMkLst>
+        <pc:spChg chg="mod">
+          <ac:chgData name="Мария Савинова" userId="e24eaf7e9b1ed84c" providerId="LiveId" clId="{FBA2780E-5BE6-4AEE-8C8C-EA7D3EE18985}" dt="2024-09-23T14:01:22.979" v="2926" actId="207"/>
+          <ac:spMkLst>
+            <pc:docMk/>
+            <pc:sldMk cId="2023720995" sldId="269"/>
+            <ac:spMk id="3" creationId="{00000000-0000-0000-0000-000000000000}"/>
+          </ac:spMkLst>
+        </pc:spChg>
+      </pc:sldChg>
+      <pc:sldChg chg="addSp delSp modSp add mod">
+        <pc:chgData name="Мария Савинова" userId="e24eaf7e9b1ed84c" providerId="LiveId" clId="{FBA2780E-5BE6-4AEE-8C8C-EA7D3EE18985}" dt="2024-09-23T13:49:37.211" v="2731" actId="20577"/>
+        <pc:sldMkLst>
+          <pc:docMk/>
+          <pc:sldMk cId="1268225968" sldId="270"/>
+        </pc:sldMkLst>
+        <pc:spChg chg="add del mod">
+          <ac:chgData name="Мария Савинова" userId="e24eaf7e9b1ed84c" providerId="LiveId" clId="{FBA2780E-5BE6-4AEE-8C8C-EA7D3EE18985}" dt="2024-09-23T13:49:37.211" v="2731" actId="20577"/>
+          <ac:spMkLst>
+            <pc:docMk/>
+            <pc:sldMk cId="1268225968" sldId="270"/>
+            <ac:spMk id="3" creationId="{00000000-0000-0000-0000-000000000000}"/>
+          </ac:spMkLst>
+        </pc:spChg>
+        <pc:spChg chg="del">
+          <ac:chgData name="Мария Савинова" userId="e24eaf7e9b1ed84c" providerId="LiveId" clId="{FBA2780E-5BE6-4AEE-8C8C-EA7D3EE18985}" dt="2024-09-23T08:03:13.967" v="1729" actId="478"/>
+          <ac:spMkLst>
+            <pc:docMk/>
+            <pc:sldMk cId="1268225968" sldId="270"/>
+            <ac:spMk id="8" creationId="{D4C95291-2C23-4352-BCC0-5C4F93100524}"/>
+          </ac:spMkLst>
+        </pc:spChg>
+        <pc:spChg chg="del">
+          <ac:chgData name="Мария Савинова" userId="e24eaf7e9b1ed84c" providerId="LiveId" clId="{FBA2780E-5BE6-4AEE-8C8C-EA7D3EE18985}" dt="2024-09-23T08:03:12.557" v="1728" actId="478"/>
+          <ac:spMkLst>
+            <pc:docMk/>
+            <pc:sldMk cId="1268225968" sldId="270"/>
+            <ac:spMk id="9" creationId="{B11FA133-F035-4245-8E62-A414ADF52242}"/>
+          </ac:spMkLst>
+        </pc:spChg>
+        <pc:spChg chg="add del">
+          <ac:chgData name="Мария Савинова" userId="e24eaf7e9b1ed84c" providerId="LiveId" clId="{FBA2780E-5BE6-4AEE-8C8C-EA7D3EE18985}" dt="2024-09-23T08:04:07.918" v="1739" actId="22"/>
+          <ac:spMkLst>
+            <pc:docMk/>
+            <pc:sldMk cId="1268225968" sldId="270"/>
+            <ac:spMk id="14" creationId="{8455FD95-B63D-47A2-A031-D16D531B9D63}"/>
+          </ac:spMkLst>
+        </pc:spChg>
+        <pc:picChg chg="add del mod">
+          <ac:chgData name="Мария Савинова" userId="e24eaf7e9b1ed84c" providerId="LiveId" clId="{FBA2780E-5BE6-4AEE-8C8C-EA7D3EE18985}" dt="2024-09-23T08:03:29.403" v="1733"/>
+          <ac:picMkLst>
+            <pc:docMk/>
+            <pc:sldMk cId="1268225968" sldId="270"/>
+            <ac:picMk id="10" creationId="{C00D257A-41E4-46A0-ACE2-A71D549CBFE7}"/>
+          </ac:picMkLst>
+        </pc:picChg>
+        <pc:picChg chg="add mod">
+          <ac:chgData name="Мария Савинова" userId="e24eaf7e9b1ed84c" providerId="LiveId" clId="{FBA2780E-5BE6-4AEE-8C8C-EA7D3EE18985}" dt="2024-09-23T08:40:10.157" v="2021" actId="1076"/>
+          <ac:picMkLst>
+            <pc:docMk/>
+            <pc:sldMk cId="1268225968" sldId="270"/>
+            <ac:picMk id="12" creationId="{3F1EB2CD-076C-49FD-891B-CE588A6566AA}"/>
+          </ac:picMkLst>
+        </pc:picChg>
+      </pc:sldChg>
+      <pc:sldChg chg="addSp delSp modSp add mod">
+        <pc:chgData name="Мария Савинова" userId="e24eaf7e9b1ed84c" providerId="LiveId" clId="{FBA2780E-5BE6-4AEE-8C8C-EA7D3EE18985}" dt="2024-09-23T13:35:03.049" v="2398" actId="20577"/>
+        <pc:sldMkLst>
+          <pc:docMk/>
+          <pc:sldMk cId="1773754508" sldId="271"/>
+        </pc:sldMkLst>
+        <pc:spChg chg="mod">
+          <ac:chgData name="Мария Савинова" userId="e24eaf7e9b1ed84c" providerId="LiveId" clId="{FBA2780E-5BE6-4AEE-8C8C-EA7D3EE18985}" dt="2024-09-23T08:07:23.648" v="1794" actId="255"/>
+          <ac:spMkLst>
+            <pc:docMk/>
+            <pc:sldMk cId="1773754508" sldId="271"/>
+            <ac:spMk id="2" creationId="{00000000-0000-0000-0000-000000000000}"/>
+          </ac:spMkLst>
+        </pc:spChg>
+        <pc:spChg chg="add del mod">
+          <ac:chgData name="Мария Савинова" userId="e24eaf7e9b1ed84c" providerId="LiveId" clId="{FBA2780E-5BE6-4AEE-8C8C-EA7D3EE18985}" dt="2024-09-23T13:35:03.049" v="2398" actId="20577"/>
+          <ac:spMkLst>
+            <pc:docMk/>
+            <pc:sldMk cId="1773754508" sldId="271"/>
+            <ac:spMk id="3" creationId="{00000000-0000-0000-0000-000000000000}"/>
+          </ac:spMkLst>
+        </pc:spChg>
+        <pc:spChg chg="del">
+          <ac:chgData name="Мария Савинова" userId="e24eaf7e9b1ed84c" providerId="LiveId" clId="{FBA2780E-5BE6-4AEE-8C8C-EA7D3EE18985}" dt="2024-09-23T08:06:24.757" v="1769" actId="478"/>
+          <ac:spMkLst>
+            <pc:docMk/>
+            <pc:sldMk cId="1773754508" sldId="271"/>
+            <ac:spMk id="8" creationId="{957AA84F-8897-4933-85BC-FB0080066665}"/>
+          </ac:spMkLst>
+        </pc:spChg>
+        <pc:spChg chg="del">
+          <ac:chgData name="Мария Савинова" userId="e24eaf7e9b1ed84c" providerId="LiveId" clId="{FBA2780E-5BE6-4AEE-8C8C-EA7D3EE18985}" dt="2024-09-23T08:06:22.872" v="1768" actId="478"/>
+          <ac:spMkLst>
+            <pc:docMk/>
+            <pc:sldMk cId="1773754508" sldId="271"/>
+            <ac:spMk id="9" creationId="{791872D6-869B-4CA8-8997-4959251037CA}"/>
+          </ac:spMkLst>
+        </pc:spChg>
+        <pc:picChg chg="add del mod">
+          <ac:chgData name="Мария Савинова" userId="e24eaf7e9b1ed84c" providerId="LiveId" clId="{FBA2780E-5BE6-4AEE-8C8C-EA7D3EE18985}" dt="2024-09-23T08:06:31.055" v="1773"/>
+          <ac:picMkLst>
+            <pc:docMk/>
+            <pc:sldMk cId="1773754508" sldId="271"/>
+            <ac:picMk id="10" creationId="{678AC721-6BA4-411F-BA2E-6D9F59D48B97}"/>
+          </ac:picMkLst>
+        </pc:picChg>
+        <pc:picChg chg="add mod">
+          <ac:chgData name="Мария Савинова" userId="e24eaf7e9b1ed84c" providerId="LiveId" clId="{FBA2780E-5BE6-4AEE-8C8C-EA7D3EE18985}" dt="2024-09-23T08:09:57.257" v="1837" actId="1036"/>
+          <ac:picMkLst>
+            <pc:docMk/>
+            <pc:sldMk cId="1773754508" sldId="271"/>
+            <ac:picMk id="12" creationId="{2A08C81A-2C63-4BEA-AFBC-BCAD96A689FE}"/>
+          </ac:picMkLst>
+        </pc:picChg>
+      </pc:sldChg>
+      <pc:sldChg chg="addSp delSp modSp add mod">
+        <pc:chgData name="Мария Савинова" userId="e24eaf7e9b1ed84c" providerId="LiveId" clId="{FBA2780E-5BE6-4AEE-8C8C-EA7D3EE18985}" dt="2024-09-23T13:59:34.032" v="2782" actId="207"/>
+        <pc:sldMkLst>
+          <pc:docMk/>
+          <pc:sldMk cId="2214237742" sldId="272"/>
+        </pc:sldMkLst>
+        <pc:spChg chg="mod">
+          <ac:chgData name="Мария Савинова" userId="e24eaf7e9b1ed84c" providerId="LiveId" clId="{FBA2780E-5BE6-4AEE-8C8C-EA7D3EE18985}" dt="2024-09-23T13:21:47.680" v="2300" actId="1076"/>
+          <ac:spMkLst>
+            <pc:docMk/>
+            <pc:sldMk cId="2214237742" sldId="272"/>
+            <ac:spMk id="3" creationId="{00000000-0000-0000-0000-000000000000}"/>
+          </ac:spMkLst>
+        </pc:spChg>
+        <pc:spChg chg="add mod">
+          <ac:chgData name="Мария Савинова" userId="e24eaf7e9b1ed84c" providerId="LiveId" clId="{FBA2780E-5BE6-4AEE-8C8C-EA7D3EE18985}" dt="2024-09-23T13:59:34.032" v="2782" actId="207"/>
+          <ac:spMkLst>
+            <pc:docMk/>
+            <pc:sldMk cId="2214237742" sldId="272"/>
+            <ac:spMk id="8" creationId="{426C69A6-A2F1-40A8-B889-C63B1AE0A2E3}"/>
+          </ac:spMkLst>
+        </pc:spChg>
+        <pc:spChg chg="add mod">
+          <ac:chgData name="Мария Савинова" userId="e24eaf7e9b1ed84c" providerId="LiveId" clId="{FBA2780E-5BE6-4AEE-8C8C-EA7D3EE18985}" dt="2024-09-23T13:58:56.964" v="2776" actId="113"/>
+          <ac:spMkLst>
+            <pc:docMk/>
+            <pc:sldMk cId="2214237742" sldId="272"/>
+            <ac:spMk id="10" creationId="{CA34E12E-4C3B-42AE-966D-48234B6733F0}"/>
+          </ac:spMkLst>
+        </pc:spChg>
+        <pc:spChg chg="add mod">
+          <ac:chgData name="Мария Савинова" userId="e24eaf7e9b1ed84c" providerId="LiveId" clId="{FBA2780E-5BE6-4AEE-8C8C-EA7D3EE18985}" dt="2024-09-23T13:21:51.824" v="2301" actId="1076"/>
+          <ac:spMkLst>
+            <pc:docMk/>
+            <pc:sldMk cId="2214237742" sldId="272"/>
+            <ac:spMk id="13" creationId="{8EB44BDF-E5AA-4176-B86D-E881FC5501F9}"/>
+          </ac:spMkLst>
+        </pc:spChg>
+        <pc:picChg chg="del">
+          <ac:chgData name="Мария Савинова" userId="e24eaf7e9b1ed84c" providerId="LiveId" clId="{FBA2780E-5BE6-4AEE-8C8C-EA7D3EE18985}" dt="2024-09-23T13:15:02.408" v="2193" actId="478"/>
+          <ac:picMkLst>
+            <pc:docMk/>
+            <pc:sldMk cId="2214237742" sldId="272"/>
+            <ac:picMk id="12" creationId="{3F1EB2CD-076C-49FD-891B-CE588A6566AA}"/>
+          </ac:picMkLst>
+        </pc:picChg>
+      </pc:sldChg>
+      <pc:sldChg chg="addSp delSp modSp add mod">
+        <pc:chgData name="Мария Савинова" userId="e24eaf7e9b1ed84c" providerId="LiveId" clId="{FBA2780E-5BE6-4AEE-8C8C-EA7D3EE18985}" dt="2024-09-23T13:53:34.678" v="2765" actId="113"/>
+        <pc:sldMkLst>
+          <pc:docMk/>
+          <pc:sldMk cId="1900805023" sldId="273"/>
+        </pc:sldMkLst>
+        <pc:spChg chg="del">
+          <ac:chgData name="Мария Савинова" userId="e24eaf7e9b1ed84c" providerId="LiveId" clId="{FBA2780E-5BE6-4AEE-8C8C-EA7D3EE18985}" dt="2024-09-23T13:45:42.186" v="2576" actId="478"/>
+          <ac:spMkLst>
+            <pc:docMk/>
+            <pc:sldMk cId="1900805023" sldId="273"/>
+            <ac:spMk id="3" creationId="{00000000-0000-0000-0000-000000000000}"/>
+          </ac:spMkLst>
+        </pc:spChg>
+        <pc:spChg chg="add del mod">
+          <ac:chgData name="Мария Савинова" userId="e24eaf7e9b1ed84c" providerId="LiveId" clId="{FBA2780E-5BE6-4AEE-8C8C-EA7D3EE18985}" dt="2024-09-23T13:45:45.964" v="2577" actId="478"/>
+          <ac:spMkLst>
+            <pc:docMk/>
+            <pc:sldMk cId="1900805023" sldId="273"/>
+            <ac:spMk id="8" creationId="{1FBD23D8-F007-43CB-A718-A87BCA6167FF}"/>
+          </ac:spMkLst>
+        </pc:spChg>
+        <pc:spChg chg="add mod">
+          <ac:chgData name="Мария Савинова" userId="e24eaf7e9b1ed84c" providerId="LiveId" clId="{FBA2780E-5BE6-4AEE-8C8C-EA7D3EE18985}" dt="2024-09-23T13:52:03.735" v="2750" actId="1076"/>
+          <ac:spMkLst>
+            <pc:docMk/>
+            <pc:sldMk cId="1900805023" sldId="273"/>
+            <ac:spMk id="10" creationId="{3049AAE2-0EE3-40AC-9FED-85CBE02A672D}"/>
+          </ac:spMkLst>
+        </pc:spChg>
+        <pc:spChg chg="add mod">
+          <ac:chgData name="Мария Савинова" userId="e24eaf7e9b1ed84c" providerId="LiveId" clId="{FBA2780E-5BE6-4AEE-8C8C-EA7D3EE18985}" dt="2024-09-23T13:51:08.949" v="2734" actId="1076"/>
+          <ac:spMkLst>
+            <pc:docMk/>
+            <pc:sldMk cId="1900805023" sldId="273"/>
+            <ac:spMk id="11" creationId="{76337475-23D1-4EB1-8FFC-51C03BD43632}"/>
+          </ac:spMkLst>
+        </pc:spChg>
+        <pc:spChg chg="add del">
+          <ac:chgData name="Мария Савинова" userId="e24eaf7e9b1ed84c" providerId="LiveId" clId="{FBA2780E-5BE6-4AEE-8C8C-EA7D3EE18985}" dt="2024-09-23T13:51:13.459" v="2738" actId="22"/>
+          <ac:spMkLst>
+            <pc:docMk/>
+            <pc:sldMk cId="1900805023" sldId="273"/>
+            <ac:spMk id="13" creationId="{7BAE43B8-F987-4590-8C6D-2C724FB5FD19}"/>
+          </ac:spMkLst>
+        </pc:spChg>
+        <pc:spChg chg="add mod">
+          <ac:chgData name="Мария Савинова" userId="e24eaf7e9b1ed84c" providerId="LiveId" clId="{FBA2780E-5BE6-4AEE-8C8C-EA7D3EE18985}" dt="2024-09-23T13:51:55.972" v="2749" actId="113"/>
+          <ac:spMkLst>
+            <pc:docMk/>
+            <pc:sldMk cId="1900805023" sldId="273"/>
+            <ac:spMk id="15" creationId="{DBBD1D5E-2F8B-470B-BC72-613749FD3CF5}"/>
+          </ac:spMkLst>
+        </pc:spChg>
+        <pc:spChg chg="add mod">
+          <ac:chgData name="Мария Савинова" userId="e24eaf7e9b1ed84c" providerId="LiveId" clId="{FBA2780E-5BE6-4AEE-8C8C-EA7D3EE18985}" dt="2024-09-23T13:53:34.678" v="2765" actId="113"/>
+          <ac:spMkLst>
+            <pc:docMk/>
+            <pc:sldMk cId="1900805023" sldId="273"/>
+            <ac:spMk id="17" creationId="{264D8D5F-531F-41A4-9F4F-09CC7050E985}"/>
+          </ac:spMkLst>
+        </pc:spChg>
+        <pc:picChg chg="del">
+          <ac:chgData name="Мария Савинова" userId="e24eaf7e9b1ed84c" providerId="LiveId" clId="{FBA2780E-5BE6-4AEE-8C8C-EA7D3EE18985}" dt="2024-09-23T13:45:39.527" v="2575" actId="478"/>
+          <ac:picMkLst>
+            <pc:docMk/>
+            <pc:sldMk cId="1900805023" sldId="273"/>
+            <ac:picMk id="12" creationId="{2A08C81A-2C63-4BEA-AFBC-BCAD96A689FE}"/>
+          </ac:picMkLst>
+        </pc:picChg>
+      </pc:sldChg>
+    </pc:docChg>
+  </pc:docChgLst>
+  <pc:docChgLst>
+    <pc:chgData name="Мария Савинова" userId="e24eaf7e9b1ed84c" providerId="LiveId" clId="{68FAC86A-2F91-4513-9991-B2223732D39B}"/>
+    <pc:docChg chg="undo redo custSel addSld modSld">
+      <pc:chgData name="Мария Савинова" userId="e24eaf7e9b1ed84c" providerId="LiveId" clId="{68FAC86A-2F91-4513-9991-B2223732D39B}" dt="2024-10-27T07:15:09.504" v="216" actId="729"/>
+      <pc:docMkLst>
+        <pc:docMk/>
+      </pc:docMkLst>
+      <pc:sldChg chg="modSp mod">
+        <pc:chgData name="Мария Савинова" userId="e24eaf7e9b1ed84c" providerId="LiveId" clId="{68FAC86A-2F91-4513-9991-B2223732D39B}" dt="2024-10-27T07:11:02.831" v="100" actId="20577"/>
+        <pc:sldMkLst>
+          <pc:docMk/>
+          <pc:sldMk cId="967994007" sldId="256"/>
+        </pc:sldMkLst>
+        <pc:spChg chg="mod">
+          <ac:chgData name="Мария Савинова" userId="e24eaf7e9b1ed84c" providerId="LiveId" clId="{68FAC86A-2F91-4513-9991-B2223732D39B}" dt="2024-10-27T07:11:02.831" v="100" actId="20577"/>
+          <ac:spMkLst>
+            <pc:docMk/>
+            <pc:sldMk cId="967994007" sldId="256"/>
+            <ac:spMk id="10" creationId="{00000000-0000-0000-0000-000000000000}"/>
+          </ac:spMkLst>
+        </pc:spChg>
+      </pc:sldChg>
+      <pc:sldChg chg="addSp delSp mod modShow">
+        <pc:chgData name="Мария Савинова" userId="e24eaf7e9b1ed84c" providerId="LiveId" clId="{68FAC86A-2F91-4513-9991-B2223732D39B}" dt="2024-10-27T07:15:09.504" v="216" actId="729"/>
+        <pc:sldMkLst>
+          <pc:docMk/>
+          <pc:sldMk cId="2023720995" sldId="269"/>
+        </pc:sldMkLst>
+        <pc:spChg chg="add del">
+          <ac:chgData name="Мария Савинова" userId="e24eaf7e9b1ed84c" providerId="LiveId" clId="{68FAC86A-2F91-4513-9991-B2223732D39B}" dt="2024-10-26T17:59:39.106" v="2" actId="22"/>
+          <ac:spMkLst>
+            <pc:docMk/>
+            <pc:sldMk cId="2023720995" sldId="269"/>
+            <ac:spMk id="8" creationId="{2769A22D-AB78-4E7B-B80A-A12EC4CDC2C3}"/>
+          </ac:spMkLst>
+        </pc:spChg>
+      </pc:sldChg>
+      <pc:sldChg chg="modSp add mod modShow">
+        <pc:chgData name="Мария Савинова" userId="e24eaf7e9b1ed84c" providerId="LiveId" clId="{68FAC86A-2F91-4513-9991-B2223732D39B}" dt="2024-10-27T07:15:05.847" v="215" actId="729"/>
+        <pc:sldMkLst>
+          <pc:docMk/>
+          <pc:sldMk cId="647362323" sldId="276"/>
+        </pc:sldMkLst>
+        <pc:spChg chg="mod">
+          <ac:chgData name="Мария Савинова" userId="e24eaf7e9b1ed84c" providerId="LiveId" clId="{68FAC86A-2F91-4513-9991-B2223732D39B}" dt="2024-10-26T18:18:09.393" v="47" actId="14100"/>
+          <ac:spMkLst>
+            <pc:docMk/>
+            <pc:sldMk cId="647362323" sldId="276"/>
+            <ac:spMk id="2" creationId="{00000000-0000-0000-0000-000000000000}"/>
+          </ac:spMkLst>
+        </pc:spChg>
+        <pc:spChg chg="mod">
+          <ac:chgData name="Мария Савинова" userId="e24eaf7e9b1ed84c" providerId="LiveId" clId="{68FAC86A-2F91-4513-9991-B2223732D39B}" dt="2024-10-27T07:13:26.281" v="214" actId="20577"/>
+          <ac:spMkLst>
+            <pc:docMk/>
+            <pc:sldMk cId="647362323" sldId="276"/>
+            <ac:spMk id="3" creationId="{00000000-0000-0000-0000-000000000000}"/>
+          </ac:spMkLst>
+        </pc:spChg>
+      </pc:sldChg>
+    </pc:docChg>
+  </pc:docChgLst>
 </pc:chgInfo>
 </file>
 
@@ -1535,7 +1598,7 @@
             <a:fld id="{C65AC966-90DC-47D7-B999-4B8AD4DFB48E}" type="datetimeFigureOut">
               <a:rPr lang="ru-RU" smtClean="0"/>
               <a:pPr/>
-              <a:t>01.10.2024</a:t>
+              <a:t>27.10.2024</a:t>
             </a:fld>
             <a:endParaRPr lang="ru-RU" dirty="0"/>
           </a:p>
@@ -2301,6 +2364,90 @@
     </p:spTree>
     <p:extLst>
       <p:ext uri="{BB962C8B-B14F-4D97-AF65-F5344CB8AC3E}">
+        <p14:creationId xmlns:p14="http://schemas.microsoft.com/office/powerpoint/2010/main" val="824391904"/>
+      </p:ext>
+    </p:extLst>
+  </p:cSld>
+  <p:clrMapOvr>
+    <a:masterClrMapping/>
+  </p:clrMapOvr>
+</p:notes>
+</file>
+
+<file path=ppt/notesSlides/notesSlide15.xml><?xml version="1.0" encoding="utf-8"?>
+<p:notes xmlns:a="http://schemas.openxmlformats.org/drawingml/2006/main" xmlns:r="http://schemas.openxmlformats.org/officeDocument/2006/relationships" xmlns:p="http://schemas.openxmlformats.org/presentationml/2006/main">
+  <p:cSld>
+    <p:spTree>
+      <p:nvGrpSpPr>
+        <p:cNvPr id="1" name=""/>
+        <p:cNvGrpSpPr/>
+        <p:nvPr/>
+      </p:nvGrpSpPr>
+      <p:grpSpPr>
+        <a:xfrm>
+          <a:off x="0" y="0"/>
+          <a:ext cx="0" cy="0"/>
+          <a:chOff x="0" y="0"/>
+          <a:chExt cx="0" cy="0"/>
+        </a:xfrm>
+      </p:grpSpPr>
+      <p:sp>
+        <p:nvSpPr>
+          <p:cNvPr id="2" name="Образ слайда 1"/>
+          <p:cNvSpPr>
+            <a:spLocks noGrp="1" noRot="1" noChangeAspect="1"/>
+          </p:cNvSpPr>
+          <p:nvPr>
+            <p:ph type="sldImg"/>
+          </p:nvPr>
+        </p:nvSpPr>
+        <p:spPr/>
+      </p:sp>
+      <p:sp>
+        <p:nvSpPr>
+          <p:cNvPr id="3" name="Заметки 2"/>
+          <p:cNvSpPr>
+            <a:spLocks noGrp="1"/>
+          </p:cNvSpPr>
+          <p:nvPr>
+            <p:ph type="body" idx="1"/>
+          </p:nvPr>
+        </p:nvSpPr>
+        <p:spPr/>
+        <p:txBody>
+          <a:bodyPr/>
+          <a:lstStyle/>
+          <a:p>
+            <a:endParaRPr lang="ru-RU"/>
+          </a:p>
+        </p:txBody>
+      </p:sp>
+      <p:sp>
+        <p:nvSpPr>
+          <p:cNvPr id="4" name="Номер слайда 3"/>
+          <p:cNvSpPr>
+            <a:spLocks noGrp="1"/>
+          </p:cNvSpPr>
+          <p:nvPr>
+            <p:ph type="sldNum" sz="quarter" idx="10"/>
+          </p:nvPr>
+        </p:nvSpPr>
+        <p:spPr/>
+        <p:txBody>
+          <a:bodyPr/>
+          <a:lstStyle/>
+          <a:p>
+            <a:fld id="{2C580A59-B265-4FF3-9170-5C16494D3846}" type="slidenum">
+              <a:rPr lang="ru-RU" smtClean="0"/>
+              <a:t>15</a:t>
+            </a:fld>
+            <a:endParaRPr lang="ru-RU"/>
+          </a:p>
+        </p:txBody>
+      </p:sp>
+    </p:spTree>
+    <p:extLst>
+      <p:ext uri="{BB962C8B-B14F-4D97-AF65-F5344CB8AC3E}">
         <p14:creationId xmlns:p14="http://schemas.microsoft.com/office/powerpoint/2010/main" val="2130478481"/>
       </p:ext>
     </p:extLst>
@@ -3112,7 +3259,7 @@
           <a:p>
             <a:fld id="{ECC89CEC-ADFD-4489-90FF-547616DBC041}" type="datetime1">
               <a:rPr lang="ru-RU" smtClean="0"/>
-              <a:t>01.10.2024</a:t>
+              <a:t>27.10.2024</a:t>
             </a:fld>
             <a:endParaRPr lang="ru-RU"/>
           </a:p>
@@ -3283,7 +3430,7 @@
           <a:p>
             <a:fld id="{86B7BB86-73CF-40D4-8C7F-CA234FF7A1EB}" type="datetime1">
               <a:rPr lang="ru-RU" smtClean="0"/>
-              <a:t>01.10.2024</a:t>
+              <a:t>27.10.2024</a:t>
             </a:fld>
             <a:endParaRPr lang="ru-RU"/>
           </a:p>
@@ -3464,7 +3611,7 @@
           <a:p>
             <a:fld id="{36B73C63-5989-47F0-8A38-867659112843}" type="datetime1">
               <a:rPr lang="ru-RU" smtClean="0"/>
-              <a:t>01.10.2024</a:t>
+              <a:t>27.10.2024</a:t>
             </a:fld>
             <a:endParaRPr lang="ru-RU"/>
           </a:p>
@@ -3635,7 +3782,7 @@
           <a:p>
             <a:fld id="{3BF531FB-401D-4CE6-8E3E-F90EF76016F4}" type="datetime1">
               <a:rPr lang="ru-RU" smtClean="0"/>
-              <a:t>01.10.2024</a:t>
+              <a:t>27.10.2024</a:t>
             </a:fld>
             <a:endParaRPr lang="ru-RU"/>
           </a:p>
@@ -3883,7 +4030,7 @@
           <a:p>
             <a:fld id="{90C6E959-BFD7-4835-A209-4198B71FE91E}" type="datetime1">
               <a:rPr lang="ru-RU" smtClean="0"/>
-              <a:t>01.10.2024</a:t>
+              <a:t>27.10.2024</a:t>
             </a:fld>
             <a:endParaRPr lang="ru-RU"/>
           </a:p>
@@ -4115,7 +4262,7 @@
           <a:p>
             <a:fld id="{523FC2E9-7EB8-4737-8E9A-9590B7C8EA3D}" type="datetime1">
               <a:rPr lang="ru-RU" smtClean="0"/>
-              <a:t>01.10.2024</a:t>
+              <a:t>27.10.2024</a:t>
             </a:fld>
             <a:endParaRPr lang="ru-RU"/>
           </a:p>
@@ -4482,7 +4629,7 @@
           <a:p>
             <a:fld id="{AD9897CF-2BDA-410D-933A-6B9BAFD70E05}" type="datetime1">
               <a:rPr lang="ru-RU" smtClean="0"/>
-              <a:t>01.10.2024</a:t>
+              <a:t>27.10.2024</a:t>
             </a:fld>
             <a:endParaRPr lang="ru-RU"/>
           </a:p>
@@ -4602,7 +4749,7 @@
           <a:p>
             <a:fld id="{417622BC-58AC-4A2D-91CE-B90BE15D141D}" type="datetime1">
               <a:rPr lang="ru-RU" smtClean="0"/>
-              <a:t>01.10.2024</a:t>
+              <a:t>27.10.2024</a:t>
             </a:fld>
             <a:endParaRPr lang="ru-RU"/>
           </a:p>
@@ -4700,7 +4847,7 @@
           <a:p>
             <a:fld id="{2DD411C1-03FD-4174-8B29-1952A17761AD}" type="datetime1">
               <a:rPr lang="ru-RU" smtClean="0"/>
-              <a:t>01.10.2024</a:t>
+              <a:t>27.10.2024</a:t>
             </a:fld>
             <a:endParaRPr lang="ru-RU"/>
           </a:p>
@@ -4978,7 +5125,7 @@
           <a:p>
             <a:fld id="{8CD6FCDF-025A-4558-B7C0-9D70D2EBCE6F}" type="datetime1">
               <a:rPr lang="ru-RU" smtClean="0"/>
-              <a:t>01.10.2024</a:t>
+              <a:t>27.10.2024</a:t>
             </a:fld>
             <a:endParaRPr lang="ru-RU"/>
           </a:p>
@@ -5233,7 +5380,7 @@
           <a:p>
             <a:fld id="{4636EB14-F614-45DD-AF15-06D5CD69D646}" type="datetime1">
               <a:rPr lang="ru-RU" smtClean="0"/>
-              <a:t>01.10.2024</a:t>
+              <a:t>27.10.2024</a:t>
             </a:fld>
             <a:endParaRPr lang="ru-RU"/>
           </a:p>
@@ -5449,7 +5596,7 @@
             <a:fld id="{149376B8-C295-4A7D-87DF-C95CA526DB0A}" type="datetime1">
               <a:rPr lang="ru-RU" smtClean="0"/>
               <a:pPr/>
-              <a:t>01.10.2024</a:t>
+              <a:t>27.10.2024</a:t>
             </a:fld>
             <a:endParaRPr lang="ru-RU" dirty="0"/>
           </a:p>
@@ -6226,7 +6373,7 @@
                 </a:solidFill>
                 <a:latin typeface="Montserrat" panose="00000500000000000000" pitchFamily="2" charset="0"/>
               </a:rPr>
-              <a:t>студент(ка) группы ИУ7-71Б</a:t>
+              <a:t>студент группы ИУ7-71Б</a:t>
             </a:r>
             <a:endParaRPr kumimoji="0" lang="en-US" altLang="ru-RU" sz="2000" dirty="0">
               <a:solidFill>
@@ -7518,6 +7665,544 @@
       </p:grpSpPr>
       <p:sp>
         <p:nvSpPr>
+          <p:cNvPr id="2" name="Заголовок 1"/>
+          <p:cNvSpPr>
+            <a:spLocks noGrp="1"/>
+          </p:cNvSpPr>
+          <p:nvPr>
+            <p:ph type="title"/>
+          </p:nvPr>
+        </p:nvSpPr>
+        <p:spPr>
+          <a:xfrm>
+            <a:off x="838200" y="1039528"/>
+            <a:ext cx="8813800" cy="651160"/>
+          </a:xfrm>
+        </p:spPr>
+        <p:txBody>
+          <a:bodyPr>
+            <a:normAutofit fontScale="90000"/>
+          </a:bodyPr>
+          <a:lstStyle/>
+          <a:p>
+            <a:r>
+              <a:rPr lang="ru-RU" b="1" dirty="0">
+                <a:solidFill>
+                  <a:srgbClr val="326CDB"/>
+                </a:solidFill>
+                <a:latin typeface="Montserrat" panose="00000500000000000000" pitchFamily="2" charset="0"/>
+                <a:cs typeface="Arial" panose="020B0604020202020204" pitchFamily="34" charset="0"/>
+              </a:rPr>
+              <a:t>Список использованных источников</a:t>
+            </a:r>
+          </a:p>
+        </p:txBody>
+      </p:sp>
+      <p:sp>
+        <p:nvSpPr>
+          <p:cNvPr id="3" name="Объект 2"/>
+          <p:cNvSpPr>
+            <a:spLocks noGrp="1"/>
+          </p:cNvSpPr>
+          <p:nvPr>
+            <p:ph idx="1"/>
+          </p:nvPr>
+        </p:nvSpPr>
+        <p:spPr/>
+        <p:txBody>
+          <a:bodyPr anchor="ctr">
+            <a:normAutofit/>
+          </a:bodyPr>
+          <a:lstStyle/>
+          <a:p>
+            <a:pPr>
+              <a:lnSpc>
+                <a:spcPct val="150000"/>
+              </a:lnSpc>
+            </a:pPr>
+            <a:r>
+              <a:rPr lang="ru-RU" sz="1300" dirty="0" err="1"/>
+              <a:t>Амангелди</a:t>
+            </a:r>
+            <a:r>
+              <a:rPr lang="ru-RU" sz="1300" dirty="0"/>
+              <a:t> Х., </a:t>
+            </a:r>
+            <a:r>
+              <a:rPr lang="ru-RU" sz="1300" dirty="0" err="1"/>
+              <a:t>Вепаберди</a:t>
+            </a:r>
+            <a:r>
+              <a:rPr lang="ru-RU" sz="1300" dirty="0"/>
+              <a:t> Д., </a:t>
+            </a:r>
+            <a:r>
+              <a:rPr lang="ru-RU" sz="1300" dirty="0" err="1"/>
+              <a:t>Реджепдурды</a:t>
+            </a:r>
+            <a:r>
+              <a:rPr lang="ru-RU" sz="1300" dirty="0"/>
+              <a:t> Г. </a:t>
+            </a:r>
+            <a:r>
+              <a:rPr lang="ru-RU" sz="1300" i="1" dirty="0"/>
+              <a:t>Цена, ее виды, факторы влияющие на цену.</a:t>
+            </a:r>
+            <a:r>
+              <a:rPr lang="ru-RU" sz="1300" dirty="0"/>
+              <a:t> — [Электронный ресурс]. — Режим доступа: </a:t>
+            </a:r>
+            <a:r>
+              <a:rPr lang="ru-RU" sz="1300" dirty="0">
+                <a:hlinkClick r:id="rId3"/>
+              </a:rPr>
+              <a:t>https://cyberleninka.ru/article/n/tsena-ee-vidy-faktory-vliyayuschiena-tsenu</a:t>
+            </a:r>
+            <a:r>
+              <a:rPr lang="ru-RU" sz="1300" dirty="0"/>
+              <a:t> 		                  </a:t>
+            </a:r>
+            <a:r>
+              <a:rPr lang="ru-RU" sz="1300" b="1" dirty="0"/>
+              <a:t>(Дата обращения: 30.09.2024 г.)</a:t>
+            </a:r>
+            <a:endParaRPr lang="ru-RU" sz="1300" b="1" dirty="0">
+              <a:latin typeface="Montserrat" panose="00000500000000000000" pitchFamily="2" charset="0"/>
+            </a:endParaRPr>
+          </a:p>
+          <a:p>
+            <a:pPr>
+              <a:lnSpc>
+                <a:spcPct val="150000"/>
+              </a:lnSpc>
+            </a:pPr>
+            <a:r>
+              <a:rPr lang="ru-RU" sz="1300" dirty="0" err="1"/>
+              <a:t>Жильцова</a:t>
+            </a:r>
+            <a:r>
+              <a:rPr lang="ru-RU" sz="1300" dirty="0"/>
+              <a:t> Э. Л. </a:t>
+            </a:r>
+            <a:r>
+              <a:rPr lang="ru-RU" sz="1300" i="1" dirty="0"/>
+              <a:t>Цена в условиях рынка. Функции цен.</a:t>
+            </a:r>
+            <a:r>
+              <a:rPr lang="ru-RU" sz="1300" dirty="0"/>
+              <a:t> — [Электронный ресурс]. — Режим доступа: </a:t>
+            </a:r>
+            <a:r>
+              <a:rPr lang="ru-RU" sz="1300" dirty="0">
+                <a:hlinkClick r:id="rId3"/>
+              </a:rPr>
+              <a:t>https://cyberleninka.ru/article/n/tsenyv-usloviyah-rynka-funktsii-tsen</a:t>
+            </a:r>
+            <a:r>
+              <a:rPr lang="ru-RU" sz="1300" dirty="0"/>
+              <a:t> </a:t>
+            </a:r>
+            <a:r>
+              <a:rPr lang="ru-RU" sz="1300" b="1" dirty="0"/>
+              <a:t>(Дата обращения: 30.09.2024 г.)</a:t>
+            </a:r>
+            <a:endParaRPr lang="ru-RU" sz="1300" b="1" dirty="0">
+              <a:latin typeface="Montserrat" panose="00000500000000000000" pitchFamily="2" charset="0"/>
+            </a:endParaRPr>
+          </a:p>
+          <a:p>
+            <a:pPr>
+              <a:lnSpc>
+                <a:spcPct val="150000"/>
+              </a:lnSpc>
+            </a:pPr>
+            <a:r>
+              <a:rPr lang="ru-RU" sz="1300" dirty="0">
+                <a:solidFill>
+                  <a:schemeClr val="tx1">
+                    <a:lumMod val="95000"/>
+                    <a:lumOff val="5000"/>
+                  </a:schemeClr>
+                </a:solidFill>
+                <a:latin typeface="Montserrat" panose="00000500000000000000" pitchFamily="2" charset="0"/>
+              </a:rPr>
+              <a:t>Ковалева Н. В</a:t>
+            </a:r>
+            <a:r>
+              <a:rPr lang="ru-RU" sz="1300" i="1" dirty="0">
+                <a:solidFill>
+                  <a:schemeClr val="tx1">
+                    <a:lumMod val="95000"/>
+                    <a:lumOff val="5000"/>
+                  </a:schemeClr>
+                </a:solidFill>
+                <a:latin typeface="Montserrat" panose="00000500000000000000" pitchFamily="2" charset="0"/>
+              </a:rPr>
+              <a:t>. Потребительский рынок.</a:t>
+            </a:r>
+            <a:r>
+              <a:rPr lang="ru-RU" sz="1300" dirty="0">
+                <a:solidFill>
+                  <a:schemeClr val="tx1">
+                    <a:lumMod val="95000"/>
+                    <a:lumOff val="5000"/>
+                  </a:schemeClr>
+                </a:solidFill>
+                <a:latin typeface="Montserrat" panose="00000500000000000000" pitchFamily="2" charset="0"/>
+              </a:rPr>
+              <a:t> — [Электронный ресурс]. — Режим доступа: </a:t>
+            </a:r>
+            <a:r>
+              <a:rPr lang="ru-RU" sz="1300" dirty="0">
+                <a:solidFill>
+                  <a:schemeClr val="tx1">
+                    <a:lumMod val="95000"/>
+                    <a:lumOff val="5000"/>
+                  </a:schemeClr>
+                </a:solidFill>
+                <a:latin typeface="Montserrat" panose="00000500000000000000" pitchFamily="2" charset="0"/>
+                <a:hlinkClick r:id="rId4"/>
+              </a:rPr>
+              <a:t>https://cyberleninka.ru/article/n/potrebitelskiyrynok</a:t>
+            </a:r>
+            <a:r>
+              <a:rPr lang="ru-RU" sz="1300" dirty="0">
+                <a:solidFill>
+                  <a:schemeClr val="tx1">
+                    <a:lumMod val="95000"/>
+                    <a:lumOff val="5000"/>
+                  </a:schemeClr>
+                </a:solidFill>
+                <a:latin typeface="Montserrat" panose="00000500000000000000" pitchFamily="2" charset="0"/>
+              </a:rPr>
+              <a:t> </a:t>
+            </a:r>
+            <a:r>
+              <a:rPr lang="ru-RU" sz="1300" b="1" dirty="0">
+                <a:solidFill>
+                  <a:schemeClr val="tx1">
+                    <a:lumMod val="95000"/>
+                    <a:lumOff val="5000"/>
+                  </a:schemeClr>
+                </a:solidFill>
+                <a:latin typeface="Montserrat" panose="00000500000000000000" pitchFamily="2" charset="0"/>
+              </a:rPr>
+              <a:t>(Дата обращения: 30.09.2024 г.)</a:t>
+            </a:r>
+          </a:p>
+          <a:p>
+            <a:pPr>
+              <a:lnSpc>
+                <a:spcPct val="150000"/>
+              </a:lnSpc>
+            </a:pPr>
+            <a:r>
+              <a:rPr lang="ru-RU" sz="1300" dirty="0" err="1">
+                <a:solidFill>
+                  <a:schemeClr val="tx1">
+                    <a:lumMod val="95000"/>
+                    <a:lumOff val="5000"/>
+                  </a:schemeClr>
+                </a:solidFill>
+                <a:latin typeface="Montserrat" panose="00000500000000000000" pitchFamily="2" charset="0"/>
+              </a:rPr>
+              <a:t>Кривенда</a:t>
+            </a:r>
+            <a:r>
+              <a:rPr lang="ru-RU" sz="1300" dirty="0">
+                <a:solidFill>
+                  <a:schemeClr val="tx1">
+                    <a:lumMod val="95000"/>
+                    <a:lumOff val="5000"/>
+                  </a:schemeClr>
+                </a:solidFill>
+                <a:latin typeface="Montserrat" panose="00000500000000000000" pitchFamily="2" charset="0"/>
+              </a:rPr>
+              <a:t> Е. А. </a:t>
+            </a:r>
+            <a:r>
+              <a:rPr lang="ru-RU" sz="1300" i="1" dirty="0">
+                <a:solidFill>
+                  <a:schemeClr val="tx1">
+                    <a:lumMod val="95000"/>
+                    <a:lumOff val="5000"/>
+                  </a:schemeClr>
+                </a:solidFill>
+                <a:latin typeface="Montserrat" panose="00000500000000000000" pitchFamily="2" charset="0"/>
+              </a:rPr>
+              <a:t>Конкурентоспособность и ее роль в рыночной экономике.</a:t>
+            </a:r>
+            <a:r>
+              <a:rPr lang="ru-RU" sz="1300" dirty="0">
+                <a:solidFill>
+                  <a:schemeClr val="tx1">
+                    <a:lumMod val="95000"/>
+                    <a:lumOff val="5000"/>
+                  </a:schemeClr>
+                </a:solidFill>
+                <a:latin typeface="Montserrat" panose="00000500000000000000" pitchFamily="2" charset="0"/>
+              </a:rPr>
+              <a:t> — Электронный ресурс]. — Режим доступа: </a:t>
+            </a:r>
+            <a:r>
+              <a:rPr lang="ru-RU" sz="1300" dirty="0">
+                <a:solidFill>
+                  <a:schemeClr val="tx1">
+                    <a:lumMod val="95000"/>
+                    <a:lumOff val="5000"/>
+                  </a:schemeClr>
+                </a:solidFill>
+                <a:latin typeface="Montserrat" panose="00000500000000000000" pitchFamily="2" charset="0"/>
+                <a:hlinkClick r:id="rId5"/>
+              </a:rPr>
+              <a:t>https://cyberleninka.ru/article/n/konkurentosposobnost-i-eyo-rol-v-rynochnoy-ekonomike</a:t>
+            </a:r>
+            <a:r>
+              <a:rPr lang="ru-RU" sz="1300" dirty="0">
+                <a:solidFill>
+                  <a:schemeClr val="tx1">
+                    <a:lumMod val="95000"/>
+                    <a:lumOff val="5000"/>
+                  </a:schemeClr>
+                </a:solidFill>
+                <a:latin typeface="Montserrat" panose="00000500000000000000" pitchFamily="2" charset="0"/>
+              </a:rPr>
+              <a:t>     </a:t>
+            </a:r>
+            <a:r>
+              <a:rPr lang="ru-RU" sz="1300" b="1" dirty="0">
+                <a:solidFill>
+                  <a:schemeClr val="tx1">
+                    <a:lumMod val="95000"/>
+                    <a:lumOff val="5000"/>
+                  </a:schemeClr>
+                </a:solidFill>
+                <a:latin typeface="Montserrat" panose="00000500000000000000" pitchFamily="2" charset="0"/>
+              </a:rPr>
+              <a:t>                             (Дата обращения: 01.10.2024 г.)</a:t>
+            </a:r>
+          </a:p>
+          <a:p>
+            <a:pPr>
+              <a:lnSpc>
+                <a:spcPct val="150000"/>
+              </a:lnSpc>
+            </a:pPr>
+            <a:r>
+              <a:rPr lang="ru-RU" sz="1300" dirty="0">
+                <a:solidFill>
+                  <a:schemeClr val="tx1">
+                    <a:lumMod val="95000"/>
+                    <a:lumOff val="5000"/>
+                  </a:schemeClr>
+                </a:solidFill>
+                <a:latin typeface="Montserrat" panose="00000500000000000000" pitchFamily="2" charset="0"/>
+              </a:rPr>
+              <a:t>Смирнова Н. И. </a:t>
+            </a:r>
+            <a:r>
+              <a:rPr lang="ru-RU" sz="1300" i="1" dirty="0">
+                <a:solidFill>
+                  <a:schemeClr val="tx1">
+                    <a:lumMod val="95000"/>
+                    <a:lumOff val="5000"/>
+                  </a:schemeClr>
+                </a:solidFill>
+                <a:latin typeface="Montserrat" panose="00000500000000000000" pitchFamily="2" charset="0"/>
+              </a:rPr>
+              <a:t>Управление затратами - метод «</a:t>
+            </a:r>
+            <a:r>
+              <a:rPr lang="ru-RU" sz="1300" i="1" dirty="0" err="1">
+                <a:solidFill>
+                  <a:schemeClr val="tx1">
+                    <a:lumMod val="95000"/>
+                    <a:lumOff val="5000"/>
+                  </a:schemeClr>
+                </a:solidFill>
+                <a:latin typeface="Montserrat" panose="00000500000000000000" pitchFamily="2" charset="0"/>
+              </a:rPr>
+              <a:t>таргет-костинг</a:t>
+            </a:r>
+            <a:r>
+              <a:rPr lang="ru-RU" sz="1300" i="1" dirty="0">
+                <a:solidFill>
+                  <a:schemeClr val="tx1">
+                    <a:lumMod val="95000"/>
+                    <a:lumOff val="5000"/>
+                  </a:schemeClr>
+                </a:solidFill>
+                <a:latin typeface="Montserrat" panose="00000500000000000000" pitchFamily="2" charset="0"/>
+              </a:rPr>
+              <a:t>»</a:t>
+            </a:r>
+            <a:r>
+              <a:rPr lang="ru-RU" sz="1300" dirty="0">
+                <a:solidFill>
+                  <a:schemeClr val="tx1">
+                    <a:lumMod val="95000"/>
+                    <a:lumOff val="5000"/>
+                  </a:schemeClr>
+                </a:solidFill>
+                <a:latin typeface="Montserrat" panose="00000500000000000000" pitchFamily="2" charset="0"/>
+              </a:rPr>
+              <a:t>. — [Электронный ресурс]. — Режим доступа: </a:t>
+            </a:r>
+            <a:r>
+              <a:rPr lang="en-US" sz="1300" dirty="0">
+                <a:solidFill>
+                  <a:schemeClr val="tx1">
+                    <a:lumMod val="95000"/>
+                    <a:lumOff val="5000"/>
+                  </a:schemeClr>
+                </a:solidFill>
+                <a:latin typeface="Montserrat" panose="00000500000000000000" pitchFamily="2" charset="0"/>
+                <a:hlinkClick r:id="rId6"/>
+              </a:rPr>
+              <a:t>https://cyberleninka.ru/article/n/upravlenie-zatratami-metod-target-kosting</a:t>
+            </a:r>
+            <a:r>
+              <a:rPr lang="ru-RU" sz="1300" b="1" dirty="0">
+                <a:solidFill>
+                  <a:schemeClr val="tx1">
+                    <a:lumMod val="95000"/>
+                    <a:lumOff val="5000"/>
+                  </a:schemeClr>
+                </a:solidFill>
+                <a:latin typeface="Montserrat" panose="00000500000000000000" pitchFamily="2" charset="0"/>
+              </a:rPr>
+              <a:t> (Дата обращения:30.09.2024 г.)</a:t>
+            </a:r>
+          </a:p>
+        </p:txBody>
+      </p:sp>
+      <p:sp>
+        <p:nvSpPr>
+          <p:cNvPr id="4" name="Нижний колонтитул 3"/>
+          <p:cNvSpPr>
+            <a:spLocks noGrp="1"/>
+          </p:cNvSpPr>
+          <p:nvPr>
+            <p:ph type="ftr" sz="quarter" idx="11"/>
+          </p:nvPr>
+        </p:nvSpPr>
+        <p:spPr/>
+        <p:txBody>
+          <a:bodyPr/>
+          <a:lstStyle/>
+          <a:p>
+            <a:r>
+              <a:rPr lang="ru-RU" dirty="0">
+                <a:latin typeface="Montserrat" panose="00000500000000000000" pitchFamily="2" charset="0"/>
+                <a:cs typeface="Arial" panose="020B0604020202020204" pitchFamily="34" charset="0"/>
+              </a:rPr>
+              <a:t>МГТУ им. Н.Э. Баумана, ИУ7 – «Программное обеспечение ЭВМ и информационные технологии»</a:t>
+            </a:r>
+          </a:p>
+        </p:txBody>
+      </p:sp>
+      <p:sp>
+        <p:nvSpPr>
+          <p:cNvPr id="5" name="Номер слайда 4"/>
+          <p:cNvSpPr>
+            <a:spLocks noGrp="1"/>
+          </p:cNvSpPr>
+          <p:nvPr>
+            <p:ph type="sldNum" sz="quarter" idx="12"/>
+          </p:nvPr>
+        </p:nvSpPr>
+        <p:spPr/>
+        <p:txBody>
+          <a:bodyPr/>
+          <a:lstStyle/>
+          <a:p>
+            <a:fld id="{9415E33C-F962-4E59-AF47-C3576160EA36}" type="slidenum">
+              <a:rPr lang="ru-RU" smtClean="0"/>
+              <a:t>14</a:t>
+            </a:fld>
+            <a:endParaRPr lang="ru-RU"/>
+          </a:p>
+        </p:txBody>
+      </p:sp>
+      <p:pic>
+        <p:nvPicPr>
+          <p:cNvPr id="7" name="Picture 2" descr="image">
+            <a:extLst>
+              <a:ext uri="{FF2B5EF4-FFF2-40B4-BE49-F238E27FC236}">
+                <a16:creationId xmlns:a16="http://schemas.microsoft.com/office/drawing/2014/main" id="{CFC6836E-3700-421C-8822-6708949CADCA}"/>
+              </a:ext>
+            </a:extLst>
+          </p:cNvPr>
+          <p:cNvPicPr>
+            <a:picLocks noChangeAspect="1" noChangeArrowheads="1"/>
+          </p:cNvPicPr>
+          <p:nvPr/>
+        </p:nvPicPr>
+        <p:blipFill>
+          <a:blip r:embed="rId7" cstate="print">
+            <a:extLst>
+              <a:ext uri="{28A0092B-C50C-407E-A947-70E740481C1C}">
+                <a14:useLocalDpi xmlns:a14="http://schemas.microsoft.com/office/drawing/2010/main" val="0"/>
+              </a:ext>
+            </a:extLst>
+          </a:blip>
+          <a:srcRect/>
+          <a:stretch>
+            <a:fillRect/>
+          </a:stretch>
+        </p:blipFill>
+        <p:spPr bwMode="auto">
+          <a:xfrm>
+            <a:off x="10193246" y="360436"/>
+            <a:ext cx="1520954" cy="1520954"/>
+          </a:xfrm>
+          <a:prstGeom prst="rect">
+            <a:avLst/>
+          </a:prstGeom>
+          <a:noFill/>
+          <a:extLst>
+            <a:ext uri="{909E8E84-426E-40DD-AFC4-6F175D3DCCD1}">
+              <a14:hiddenFill xmlns:a14="http://schemas.microsoft.com/office/drawing/2010/main">
+                <a:solidFill>
+                  <a:srgbClr val="FFFFFF"/>
+                </a:solidFill>
+              </a14:hiddenFill>
+            </a:ext>
+          </a:extLst>
+        </p:spPr>
+      </p:pic>
+    </p:spTree>
+    <p:extLst>
+      <p:ext uri="{BB962C8B-B14F-4D97-AF65-F5344CB8AC3E}">
+        <p14:creationId xmlns:p14="http://schemas.microsoft.com/office/powerpoint/2010/main" val="647362323"/>
+      </p:ext>
+    </p:extLst>
+  </p:cSld>
+  <p:clrMapOvr>
+    <a:masterClrMapping/>
+  </p:clrMapOvr>
+</p:sld>
+</file>
+
+<file path=ppt/slides/slide15.xml><?xml version="1.0" encoding="utf-8"?>
+<p:sld xmlns:a="http://schemas.openxmlformats.org/drawingml/2006/main" xmlns:r="http://schemas.openxmlformats.org/officeDocument/2006/relationships" xmlns:p="http://schemas.openxmlformats.org/presentationml/2006/main">
+  <p:cSld>
+    <p:spTree>
+      <p:nvGrpSpPr>
+        <p:cNvPr id="1" name=""/>
+        <p:cNvGrpSpPr/>
+        <p:nvPr/>
+      </p:nvGrpSpPr>
+      <p:grpSpPr>
+        <a:xfrm>
+          <a:off x="0" y="0"/>
+          <a:ext cx="0" cy="0"/>
+          <a:chOff x="0" y="0"/>
+          <a:chExt cx="0" cy="0"/>
+        </a:xfrm>
+      </p:grpSpPr>
+      <p:sp>
+        <p:nvSpPr>
           <p:cNvPr id="3" name="Объект 2"/>
           <p:cNvSpPr>
             <a:spLocks noGrp="1"/>
@@ -7592,7 +8277,7 @@
           <a:p>
             <a:fld id="{9415E33C-F962-4E59-AF47-C3576160EA36}" type="slidenum">
               <a:rPr lang="ru-RU" smtClean="0"/>
-              <a:t>14</a:t>
+              <a:t>15</a:t>
             </a:fld>
             <a:endParaRPr lang="ru-RU"/>
           </a:p>

</xml_diff>